<commit_message>
Character Animation PPT Upload
</commit_message>
<xml_diff>
--- a/Common/Chapter 23 Character Animation.pptx
+++ b/Common/Chapter 23 Character Animation.pptx
@@ -5,20 +5,23 @@
     <p:sldMasterId id="2147483648" r:id="rId1"/>
   </p:sldMasterIdLst>
   <p:notesMasterIdLst>
-    <p:notesMasterId r:id="rId10"/>
+    <p:notesMasterId r:id="rId13"/>
   </p:notesMasterIdLst>
   <p:handoutMasterIdLst>
-    <p:handoutMasterId r:id="rId11"/>
+    <p:handoutMasterId r:id="rId14"/>
   </p:handoutMasterIdLst>
   <p:sldIdLst>
     <p:sldId id="261" r:id="rId2"/>
     <p:sldId id="273" r:id="rId3"/>
     <p:sldId id="257" r:id="rId4"/>
-    <p:sldId id="281" r:id="rId5"/>
-    <p:sldId id="282" r:id="rId6"/>
-    <p:sldId id="283" r:id="rId7"/>
-    <p:sldId id="284" r:id="rId8"/>
-    <p:sldId id="285" r:id="rId9"/>
+    <p:sldId id="286" r:id="rId5"/>
+    <p:sldId id="287" r:id="rId6"/>
+    <p:sldId id="288" r:id="rId7"/>
+    <p:sldId id="290" r:id="rId8"/>
+    <p:sldId id="291" r:id="rId9"/>
+    <p:sldId id="292" r:id="rId10"/>
+    <p:sldId id="293" r:id="rId11"/>
+    <p:sldId id="294" r:id="rId12"/>
   </p:sldIdLst>
   <p:sldSz cx="12192000" cy="6858000"/>
   <p:notesSz cx="6858000" cy="9144000"/>
@@ -229,7 +232,7 @@
                 <a:latin typeface="맑은 고딕" panose="020B0503020000020004" pitchFamily="50" charset="-127"/>
                 <a:ea typeface="맑은 고딕" panose="020B0503020000020004" pitchFamily="50" charset="-127"/>
               </a:rPr>
-              <a:t>2019년 8월 29일</a:t>
+              <a:t>2019년 8월 30일</a:t>
             </a:fld>
             <a:endParaRPr lang="ko-KR" altLang="en-US" dirty="0">
               <a:latin typeface="맑은 고딕" panose="020B0503020000020004" pitchFamily="50" charset="-127"/>
@@ -415,7 +418,7 @@
             <a:fld id="{BE16EC8A-0758-4FA9-BF4D-3119057076D1}" type="datetime4">
               <a:rPr lang="ko-KR" altLang="en-US" smtClean="0"/>
               <a:pPr/>
-              <a:t>2019년 8월 29일</a:t>
+              <a:t>2019년 8월 30일</a:t>
             </a:fld>
             <a:endParaRPr lang="ko-KR" altLang="en-US" dirty="0"/>
           </a:p>
@@ -788,6 +791,196 @@
 </p:notes>
 </file>
 
+<file path=ppt/notesSlides/notesSlide10.xml><?xml version="1.0" encoding="utf-8"?>
+<p:notes xmlns:a="http://schemas.openxmlformats.org/drawingml/2006/main" xmlns:r="http://schemas.openxmlformats.org/officeDocument/2006/relationships" xmlns:p="http://schemas.openxmlformats.org/presentationml/2006/main">
+  <p:cSld>
+    <p:spTree>
+      <p:nvGrpSpPr>
+        <p:cNvPr id="1" name=""/>
+        <p:cNvGrpSpPr/>
+        <p:nvPr/>
+      </p:nvGrpSpPr>
+      <p:grpSpPr>
+        <a:xfrm>
+          <a:off x="0" y="0"/>
+          <a:ext cx="0" cy="0"/>
+          <a:chOff x="0" y="0"/>
+          <a:chExt cx="0" cy="0"/>
+        </a:xfrm>
+      </p:grpSpPr>
+      <p:sp>
+        <p:nvSpPr>
+          <p:cNvPr id="2" name="슬라이드 이미지 개체 틀 1"/>
+          <p:cNvSpPr>
+            <a:spLocks noGrp="1" noRot="1" noChangeAspect="1"/>
+          </p:cNvSpPr>
+          <p:nvPr>
+            <p:ph type="sldImg"/>
+          </p:nvPr>
+        </p:nvSpPr>
+        <p:spPr/>
+      </p:sp>
+      <p:sp>
+        <p:nvSpPr>
+          <p:cNvPr id="3" name="슬라이드 노트 개체 틀 2"/>
+          <p:cNvSpPr>
+            <a:spLocks noGrp="1"/>
+          </p:cNvSpPr>
+          <p:nvPr>
+            <p:ph type="body" idx="1"/>
+          </p:nvPr>
+        </p:nvSpPr>
+        <p:spPr/>
+        <p:txBody>
+          <a:bodyPr rtlCol="0"/>
+          <a:lstStyle/>
+          <a:p>
+            <a:pPr rtl="0"/>
+            <a:endParaRPr lang="en-US" altLang="ko-KR" baseline="0" dirty="0">
+              <a:latin typeface="맑은 고딕" panose="020B0503020000020004" pitchFamily="50" charset="-127"/>
+              <a:ea typeface="맑은 고딕" panose="020B0503020000020004" pitchFamily="50" charset="-127"/>
+            </a:endParaRPr>
+          </a:p>
+        </p:txBody>
+      </p:sp>
+      <p:sp>
+        <p:nvSpPr>
+          <p:cNvPr id="4" name="슬라이드 번호 개체 틀 3"/>
+          <p:cNvSpPr>
+            <a:spLocks noGrp="1"/>
+          </p:cNvSpPr>
+          <p:nvPr>
+            <p:ph type="sldNum" sz="quarter" idx="10"/>
+          </p:nvPr>
+        </p:nvSpPr>
+        <p:spPr/>
+        <p:txBody>
+          <a:bodyPr rtlCol="0"/>
+          <a:lstStyle/>
+          <a:p>
+            <a:pPr rtl="0"/>
+            <a:fld id="{82869989-EB00-4EE7-BCB5-25BDC5BB29F8}" type="slidenum">
+              <a:rPr lang="en-US" altLang="ko-KR" smtClean="0">
+                <a:latin typeface="맑은 고딕" panose="020B0503020000020004" pitchFamily="50" charset="-127"/>
+                <a:ea typeface="맑은 고딕" panose="020B0503020000020004" pitchFamily="50" charset="-127"/>
+              </a:rPr>
+              <a:t>10</a:t>
+            </a:fld>
+            <a:endParaRPr lang="ko-KR" altLang="en-US" dirty="0">
+              <a:latin typeface="맑은 고딕" panose="020B0503020000020004" pitchFamily="50" charset="-127"/>
+              <a:ea typeface="맑은 고딕" panose="020B0503020000020004" pitchFamily="50" charset="-127"/>
+            </a:endParaRPr>
+          </a:p>
+        </p:txBody>
+      </p:sp>
+    </p:spTree>
+    <p:extLst>
+      <p:ext uri="{BB962C8B-B14F-4D97-AF65-F5344CB8AC3E}">
+        <p14:creationId xmlns:p14="http://schemas.microsoft.com/office/powerpoint/2010/main" val="2387675745"/>
+      </p:ext>
+    </p:extLst>
+  </p:cSld>
+  <p:clrMapOvr>
+    <a:masterClrMapping/>
+  </p:clrMapOvr>
+</p:notes>
+</file>
+
+<file path=ppt/notesSlides/notesSlide11.xml><?xml version="1.0" encoding="utf-8"?>
+<p:notes xmlns:a="http://schemas.openxmlformats.org/drawingml/2006/main" xmlns:r="http://schemas.openxmlformats.org/officeDocument/2006/relationships" xmlns:p="http://schemas.openxmlformats.org/presentationml/2006/main">
+  <p:cSld>
+    <p:spTree>
+      <p:nvGrpSpPr>
+        <p:cNvPr id="1" name=""/>
+        <p:cNvGrpSpPr/>
+        <p:nvPr/>
+      </p:nvGrpSpPr>
+      <p:grpSpPr>
+        <a:xfrm>
+          <a:off x="0" y="0"/>
+          <a:ext cx="0" cy="0"/>
+          <a:chOff x="0" y="0"/>
+          <a:chExt cx="0" cy="0"/>
+        </a:xfrm>
+      </p:grpSpPr>
+      <p:sp>
+        <p:nvSpPr>
+          <p:cNvPr id="2" name="슬라이드 이미지 개체 틀 1"/>
+          <p:cNvSpPr>
+            <a:spLocks noGrp="1" noRot="1" noChangeAspect="1"/>
+          </p:cNvSpPr>
+          <p:nvPr>
+            <p:ph type="sldImg"/>
+          </p:nvPr>
+        </p:nvSpPr>
+        <p:spPr/>
+      </p:sp>
+      <p:sp>
+        <p:nvSpPr>
+          <p:cNvPr id="3" name="슬라이드 노트 개체 틀 2"/>
+          <p:cNvSpPr>
+            <a:spLocks noGrp="1"/>
+          </p:cNvSpPr>
+          <p:nvPr>
+            <p:ph type="body" idx="1"/>
+          </p:nvPr>
+        </p:nvSpPr>
+        <p:spPr/>
+        <p:txBody>
+          <a:bodyPr rtlCol="0"/>
+          <a:lstStyle/>
+          <a:p>
+            <a:pPr rtl="0"/>
+            <a:endParaRPr lang="en-US" altLang="ko-KR" baseline="0" dirty="0">
+              <a:latin typeface="맑은 고딕" panose="020B0503020000020004" pitchFamily="50" charset="-127"/>
+              <a:ea typeface="맑은 고딕" panose="020B0503020000020004" pitchFamily="50" charset="-127"/>
+            </a:endParaRPr>
+          </a:p>
+        </p:txBody>
+      </p:sp>
+      <p:sp>
+        <p:nvSpPr>
+          <p:cNvPr id="4" name="슬라이드 번호 개체 틀 3"/>
+          <p:cNvSpPr>
+            <a:spLocks noGrp="1"/>
+          </p:cNvSpPr>
+          <p:nvPr>
+            <p:ph type="sldNum" sz="quarter" idx="10"/>
+          </p:nvPr>
+        </p:nvSpPr>
+        <p:spPr/>
+        <p:txBody>
+          <a:bodyPr rtlCol="0"/>
+          <a:lstStyle/>
+          <a:p>
+            <a:pPr rtl="0"/>
+            <a:fld id="{82869989-EB00-4EE7-BCB5-25BDC5BB29F8}" type="slidenum">
+              <a:rPr lang="en-US" altLang="ko-KR" smtClean="0">
+                <a:latin typeface="맑은 고딕" panose="020B0503020000020004" pitchFamily="50" charset="-127"/>
+                <a:ea typeface="맑은 고딕" panose="020B0503020000020004" pitchFamily="50" charset="-127"/>
+              </a:rPr>
+              <a:t>11</a:t>
+            </a:fld>
+            <a:endParaRPr lang="ko-KR" altLang="en-US" dirty="0">
+              <a:latin typeface="맑은 고딕" panose="020B0503020000020004" pitchFamily="50" charset="-127"/>
+              <a:ea typeface="맑은 고딕" panose="020B0503020000020004" pitchFamily="50" charset="-127"/>
+            </a:endParaRPr>
+          </a:p>
+        </p:txBody>
+      </p:sp>
+    </p:spTree>
+    <p:extLst>
+      <p:ext uri="{BB962C8B-B14F-4D97-AF65-F5344CB8AC3E}">
+        <p14:creationId xmlns:p14="http://schemas.microsoft.com/office/powerpoint/2010/main" val="1367016445"/>
+      </p:ext>
+    </p:extLst>
+  </p:cSld>
+  <p:clrMapOvr>
+    <a:masterClrMapping/>
+  </p:clrMapOvr>
+</p:notes>
+</file>
+
 <file path=ppt/notesSlides/notesSlide2.xml><?xml version="1.0" encoding="utf-8"?>
 <p:notes xmlns:a="http://schemas.openxmlformats.org/drawingml/2006/main" xmlns:r="http://schemas.openxmlformats.org/officeDocument/2006/relationships" xmlns:p="http://schemas.openxmlformats.org/presentationml/2006/main">
   <p:cSld>
@@ -1023,6 +1216,104 @@
           <a:lstStyle/>
           <a:p>
             <a:pPr rtl="0"/>
+            <a:r>
+              <a:rPr lang="ko-KR" altLang="en-US" smtClean="0">
+                <a:latin typeface="맑은 고딕" panose="020B0503020000020004" pitchFamily="50" charset="-127"/>
+                <a:ea typeface="맑은 고딕" panose="020B0503020000020004" pitchFamily="50" charset="-127"/>
+              </a:rPr>
+              <a:t>아래쪽 화살표 </a:t>
+            </a:r>
+            <a:r>
+              <a:rPr lang="en-US" altLang="ko-KR" smtClean="0">
+                <a:latin typeface="맑은 고딕" panose="020B0503020000020004" pitchFamily="50" charset="-127"/>
+                <a:ea typeface="맑은 고딕" panose="020B0503020000020004" pitchFamily="50" charset="-127"/>
+              </a:rPr>
+              <a:t>: ‘</a:t>
+            </a:r>
+            <a:r>
+              <a:rPr lang="ko-KR" altLang="en-US" smtClean="0">
+                <a:latin typeface="맑은 고딕" panose="020B0503020000020004" pitchFamily="50" charset="-127"/>
+                <a:ea typeface="맑은 고딕" panose="020B0503020000020004" pitchFamily="50" charset="-127"/>
+              </a:rPr>
+              <a:t>첫째 자식</a:t>
+            </a:r>
+            <a:r>
+              <a:rPr lang="en-US" altLang="ko-KR" smtClean="0">
+                <a:latin typeface="맑은 고딕" panose="020B0503020000020004" pitchFamily="50" charset="-127"/>
+                <a:ea typeface="맑은 고딕" panose="020B0503020000020004" pitchFamily="50" charset="-127"/>
+              </a:rPr>
+              <a:t>‘</a:t>
+            </a:r>
+            <a:r>
+              <a:rPr lang="ko-KR" altLang="en-US" smtClean="0">
+                <a:latin typeface="맑은 고딕" panose="020B0503020000020004" pitchFamily="50" charset="-127"/>
+                <a:ea typeface="맑은 고딕" panose="020B0503020000020004" pitchFamily="50" charset="-127"/>
+              </a:rPr>
+              <a:t>관계</a:t>
+            </a:r>
+            <a:endParaRPr lang="en-US" altLang="ko-KR" smtClean="0">
+              <a:latin typeface="맑은 고딕" panose="020B0503020000020004" pitchFamily="50" charset="-127"/>
+              <a:ea typeface="맑은 고딕" panose="020B0503020000020004" pitchFamily="50" charset="-127"/>
+            </a:endParaRPr>
+          </a:p>
+          <a:p>
+            <a:pPr rtl="0"/>
+            <a:r>
+              <a:rPr lang="ko-KR" altLang="en-US" smtClean="0">
+                <a:latin typeface="맑은 고딕" panose="020B0503020000020004" pitchFamily="50" charset="-127"/>
+                <a:ea typeface="맑은 고딕" panose="020B0503020000020004" pitchFamily="50" charset="-127"/>
+              </a:rPr>
+              <a:t>오른쪽 화살표 </a:t>
+            </a:r>
+            <a:r>
+              <a:rPr lang="en-US" altLang="ko-KR" smtClean="0">
+                <a:latin typeface="맑은 고딕" panose="020B0503020000020004" pitchFamily="50" charset="-127"/>
+                <a:ea typeface="맑은 고딕" panose="020B0503020000020004" pitchFamily="50" charset="-127"/>
+              </a:rPr>
+              <a:t>: ‘</a:t>
+            </a:r>
+            <a:r>
+              <a:rPr lang="ko-KR" altLang="en-US" smtClean="0">
+                <a:latin typeface="맑은 고딕" panose="020B0503020000020004" pitchFamily="50" charset="-127"/>
+                <a:ea typeface="맑은 고딕" panose="020B0503020000020004" pitchFamily="50" charset="-127"/>
+              </a:rPr>
+              <a:t>동기</a:t>
+            </a:r>
+            <a:r>
+              <a:rPr lang="en-US" altLang="ko-KR" smtClean="0">
+                <a:latin typeface="맑은 고딕" panose="020B0503020000020004" pitchFamily="50" charset="-127"/>
+                <a:ea typeface="맑은 고딕" panose="020B0503020000020004" pitchFamily="50" charset="-127"/>
+              </a:rPr>
+              <a:t>(sibling</a:t>
+            </a:r>
+            <a:r>
+              <a:rPr lang="en-US" altLang="ko-KR" baseline="0" smtClean="0">
+                <a:latin typeface="맑은 고딕" panose="020B0503020000020004" pitchFamily="50" charset="-127"/>
+                <a:ea typeface="맑은 고딕" panose="020B0503020000020004" pitchFamily="50" charset="-127"/>
+              </a:rPr>
+              <a:t> : </a:t>
+            </a:r>
+            <a:r>
+              <a:rPr lang="ko-KR" altLang="en-US" baseline="0" smtClean="0">
+                <a:latin typeface="맑은 고딕" panose="020B0503020000020004" pitchFamily="50" charset="-127"/>
+                <a:ea typeface="맑은 고딕" panose="020B0503020000020004" pitchFamily="50" charset="-127"/>
+              </a:rPr>
+              <a:t>부모가 같음</a:t>
+            </a:r>
+            <a:r>
+              <a:rPr lang="en-US" altLang="ko-KR" baseline="0" smtClean="0">
+                <a:latin typeface="맑은 고딕" panose="020B0503020000020004" pitchFamily="50" charset="-127"/>
+                <a:ea typeface="맑은 고딕" panose="020B0503020000020004" pitchFamily="50" charset="-127"/>
+              </a:rPr>
+              <a:t>)‘</a:t>
+            </a:r>
+            <a:r>
+              <a:rPr lang="ko-KR" altLang="en-US" baseline="0" smtClean="0">
+                <a:latin typeface="맑은 고딕" panose="020B0503020000020004" pitchFamily="50" charset="-127"/>
+                <a:ea typeface="맑은 고딕" panose="020B0503020000020004" pitchFamily="50" charset="-127"/>
+              </a:rPr>
+              <a:t>관계</a:t>
+            </a:r>
             <a:endParaRPr lang="ko-KR" altLang="en-US" dirty="0">
               <a:latin typeface="맑은 고딕" panose="020B0503020000020004" pitchFamily="50" charset="-127"/>
               <a:ea typeface="맑은 고딕" panose="020B0503020000020004" pitchFamily="50" charset="-127"/>
@@ -1063,7 +1354,7 @@
     </p:spTree>
     <p:extLst>
       <p:ext uri="{BB962C8B-B14F-4D97-AF65-F5344CB8AC3E}">
-        <p14:creationId xmlns:p14="http://schemas.microsoft.com/office/powerpoint/2010/main" val="3353111740"/>
+        <p14:creationId xmlns:p14="http://schemas.microsoft.com/office/powerpoint/2010/main" val="3108849238"/>
       </p:ext>
     </p:extLst>
   </p:cSld>
@@ -1118,7 +1409,90 @@
           <a:lstStyle/>
           <a:p>
             <a:pPr rtl="0"/>
-            <a:endParaRPr lang="ko-KR" altLang="en-US" dirty="0">
+            <a:r>
+              <a:rPr lang="ko-KR" altLang="en-US" smtClean="0">
+                <a:latin typeface="맑은 고딕" panose="020B0503020000020004" pitchFamily="50" charset="-127"/>
+                <a:ea typeface="맑은 고딕" panose="020B0503020000020004" pitchFamily="50" charset="-127"/>
+              </a:rPr>
+              <a:t>계통구조의 각 물체는 물체의 국소 좌표계와 접합부</a:t>
+            </a:r>
+            <a:r>
+              <a:rPr lang="en-US" altLang="ko-KR" smtClean="0">
+                <a:latin typeface="맑은 고딕" panose="020B0503020000020004" pitchFamily="50" charset="-127"/>
+                <a:ea typeface="맑은 고딕" panose="020B0503020000020004" pitchFamily="50" charset="-127"/>
+              </a:rPr>
+              <a:t>(pivot joint) </a:t>
+            </a:r>
+            <a:r>
+              <a:rPr lang="ko-KR" altLang="en-US" smtClean="0">
+                <a:latin typeface="맑은 고딕" panose="020B0503020000020004" pitchFamily="50" charset="-127"/>
+                <a:ea typeface="맑은 고딕" panose="020B0503020000020004" pitchFamily="50" charset="-127"/>
+              </a:rPr>
+              <a:t>또는 관절로 모형화된다</a:t>
+            </a:r>
+            <a:r>
+              <a:rPr lang="en-US" altLang="ko-KR" smtClean="0">
+                <a:latin typeface="맑은 고딕" panose="020B0503020000020004" pitchFamily="50" charset="-127"/>
+                <a:ea typeface="맑은 고딕" panose="020B0503020000020004" pitchFamily="50" charset="-127"/>
+              </a:rPr>
+              <a:t>.</a:t>
+            </a:r>
+          </a:p>
+          <a:p>
+            <a:pPr rtl="0"/>
+            <a:r>
+              <a:rPr lang="ko-KR" altLang="en-US" smtClean="0">
+                <a:latin typeface="맑은 고딕" panose="020B0503020000020004" pitchFamily="50" charset="-127"/>
+                <a:ea typeface="맑은 고딕" panose="020B0503020000020004" pitchFamily="50" charset="-127"/>
+              </a:rPr>
+              <a:t>물체의 회전을 용이하게 하기 위해</a:t>
+            </a:r>
+            <a:r>
+              <a:rPr lang="en-US" altLang="ko-KR" smtClean="0">
+                <a:latin typeface="맑은 고딕" panose="020B0503020000020004" pitchFamily="50" charset="-127"/>
+                <a:ea typeface="맑은 고딕" panose="020B0503020000020004" pitchFamily="50" charset="-127"/>
+              </a:rPr>
+              <a:t>,</a:t>
+            </a:r>
+            <a:r>
+              <a:rPr lang="en-US" altLang="ko-KR" baseline="0" smtClean="0">
+                <a:latin typeface="맑은 고딕" panose="020B0503020000020004" pitchFamily="50" charset="-127"/>
+                <a:ea typeface="맑은 고딕" panose="020B0503020000020004" pitchFamily="50" charset="-127"/>
+              </a:rPr>
+              <a:t> </a:t>
+            </a:r>
+            <a:r>
+              <a:rPr lang="ko-KR" altLang="en-US" baseline="0" smtClean="0">
+                <a:latin typeface="맑은 고딕" panose="020B0503020000020004" pitchFamily="50" charset="-127"/>
+                <a:ea typeface="맑은 고딕" panose="020B0503020000020004" pitchFamily="50" charset="-127"/>
+              </a:rPr>
+              <a:t>관절은 물체 국소 좌표계의 원점에 둔다</a:t>
+            </a:r>
+            <a:r>
+              <a:rPr lang="en-US" altLang="ko-KR" baseline="0" smtClean="0">
+                <a:latin typeface="맑은 고딕" panose="020B0503020000020004" pitchFamily="50" charset="-127"/>
+                <a:ea typeface="맑은 고딕" panose="020B0503020000020004" pitchFamily="50" charset="-127"/>
+              </a:rPr>
+              <a:t>.</a:t>
+            </a:r>
+          </a:p>
+          <a:p>
+            <a:pPr rtl="0"/>
+            <a:r>
+              <a:rPr lang="ko-KR" altLang="en-US" baseline="0" smtClean="0">
+                <a:latin typeface="맑은 고딕" panose="020B0503020000020004" pitchFamily="50" charset="-127"/>
+                <a:ea typeface="맑은 고딕" panose="020B0503020000020004" pitchFamily="50" charset="-127"/>
+              </a:rPr>
+              <a:t>각 국소 좌표계를 그 부모 좌표계를 기준으로 서술할 수 있다</a:t>
+            </a:r>
+            <a:r>
+              <a:rPr lang="en-US" altLang="ko-KR" baseline="0" smtClean="0">
+                <a:latin typeface="맑은 고딕" panose="020B0503020000020004" pitchFamily="50" charset="-127"/>
+                <a:ea typeface="맑은 고딕" panose="020B0503020000020004" pitchFamily="50" charset="-127"/>
+              </a:rPr>
+              <a:t>.</a:t>
+            </a:r>
+            <a:endParaRPr lang="en-US" altLang="ko-KR" baseline="0" dirty="0">
               <a:latin typeface="맑은 고딕" panose="020B0503020000020004" pitchFamily="50" charset="-127"/>
               <a:ea typeface="맑은 고딕" panose="020B0503020000020004" pitchFamily="50" charset="-127"/>
             </a:endParaRPr>
@@ -1158,7 +1532,7 @@
     </p:spTree>
     <p:extLst>
       <p:ext uri="{BB962C8B-B14F-4D97-AF65-F5344CB8AC3E}">
-        <p14:creationId xmlns:p14="http://schemas.microsoft.com/office/powerpoint/2010/main" val="2996649673"/>
+        <p14:creationId xmlns:p14="http://schemas.microsoft.com/office/powerpoint/2010/main" val="2015549424"/>
       </p:ext>
     </p:extLst>
   </p:cSld>
@@ -1213,7 +1587,21 @@
           <a:lstStyle/>
           <a:p>
             <a:pPr rtl="0"/>
-            <a:endParaRPr lang="ko-KR" altLang="en-US" dirty="0">
+            <a:r>
+              <a:rPr lang="ko-KR" altLang="en-US" baseline="0" smtClean="0">
+                <a:latin typeface="맑은 고딕" panose="020B0503020000020004" pitchFamily="50" charset="-127"/>
+                <a:ea typeface="맑은 고딕" panose="020B0503020000020004" pitchFamily="50" charset="-127"/>
+              </a:rPr>
+              <a:t>팔 계통구조의 한 물체를 변환하려면 그 물체가 세계 공간에 도달할 때까지 물체의 부모를 비롯한 모든 조상의 부모 변환들을 오름차순으로 적용하면 된다</a:t>
+            </a:r>
+            <a:r>
+              <a:rPr lang="en-US" altLang="ko-KR" baseline="0" smtClean="0">
+                <a:latin typeface="맑은 고딕" panose="020B0503020000020004" pitchFamily="50" charset="-127"/>
+                <a:ea typeface="맑은 고딕" panose="020B0503020000020004" pitchFamily="50" charset="-127"/>
+              </a:rPr>
+              <a:t>.</a:t>
+            </a:r>
+            <a:endParaRPr lang="en-US" altLang="ko-KR" baseline="0" dirty="0">
               <a:latin typeface="맑은 고딕" panose="020B0503020000020004" pitchFamily="50" charset="-127"/>
               <a:ea typeface="맑은 고딕" panose="020B0503020000020004" pitchFamily="50" charset="-127"/>
             </a:endParaRPr>
@@ -1253,7 +1641,7 @@
     </p:spTree>
     <p:extLst>
       <p:ext uri="{BB962C8B-B14F-4D97-AF65-F5344CB8AC3E}">
-        <p14:creationId xmlns:p14="http://schemas.microsoft.com/office/powerpoint/2010/main" val="2011557525"/>
+        <p14:creationId xmlns:p14="http://schemas.microsoft.com/office/powerpoint/2010/main" val="1317280594"/>
       </p:ext>
     </p:extLst>
   </p:cSld>
@@ -1308,7 +1696,139 @@
           <a:lstStyle/>
           <a:p>
             <a:pPr rtl="0"/>
-            <a:endParaRPr lang="ko-KR" altLang="en-US" dirty="0">
+            <a:r>
+              <a:rPr lang="ko-KR" altLang="en-US" baseline="0" smtClean="0">
+                <a:latin typeface="맑은 고딕" panose="020B0503020000020004" pitchFamily="50" charset="-127"/>
+                <a:ea typeface="맑은 고딕" panose="020B0503020000020004" pitchFamily="50" charset="-127"/>
+              </a:rPr>
+              <a:t>초기 표피의 정점들이 결속공간</a:t>
+            </a:r>
+            <a:r>
+              <a:rPr lang="en-US" altLang="ko-KR" baseline="0" smtClean="0">
+                <a:latin typeface="맑은 고딕" panose="020B0503020000020004" pitchFamily="50" charset="-127"/>
+                <a:ea typeface="맑은 고딕" panose="020B0503020000020004" pitchFamily="50" charset="-127"/>
+              </a:rPr>
+              <a:t>(bind space)</a:t>
+            </a:r>
+            <a:r>
+              <a:rPr lang="ko-KR" altLang="en-US" baseline="0" smtClean="0">
+                <a:latin typeface="맑은 고딕" panose="020B0503020000020004" pitchFamily="50" charset="-127"/>
+                <a:ea typeface="맑은 고딕" panose="020B0503020000020004" pitchFamily="50" charset="-127"/>
+              </a:rPr>
+              <a:t>를 기준으로 한다</a:t>
+            </a:r>
+            <a:r>
+              <a:rPr lang="en-US" altLang="ko-KR" baseline="0" smtClean="0">
+                <a:latin typeface="맑은 고딕" panose="020B0503020000020004" pitchFamily="50" charset="-127"/>
+                <a:ea typeface="맑은 고딕" panose="020B0503020000020004" pitchFamily="50" charset="-127"/>
+              </a:rPr>
+              <a:t>. -&gt; </a:t>
+            </a:r>
+            <a:r>
+              <a:rPr lang="ko-KR" altLang="en-US" baseline="0" smtClean="0">
+                <a:latin typeface="맑은 고딕" panose="020B0503020000020004" pitchFamily="50" charset="-127"/>
+                <a:ea typeface="맑은 고딕" panose="020B0503020000020004" pitchFamily="50" charset="-127"/>
+              </a:rPr>
+              <a:t>결속공간은 전체 표피가 정의된 국소 좌표계로</a:t>
+            </a:r>
+            <a:r>
+              <a:rPr lang="en-US" altLang="ko-KR" baseline="0" smtClean="0">
+                <a:latin typeface="맑은 고딕" panose="020B0503020000020004" pitchFamily="50" charset="-127"/>
+                <a:ea typeface="맑은 고딕" panose="020B0503020000020004" pitchFamily="50" charset="-127"/>
+              </a:rPr>
+              <a:t>, </a:t>
+            </a:r>
+            <a:r>
+              <a:rPr lang="ko-KR" altLang="en-US" baseline="0" smtClean="0">
+                <a:latin typeface="맑은 고딕" panose="020B0503020000020004" pitchFamily="50" charset="-127"/>
+                <a:ea typeface="맑은 고딕" panose="020B0503020000020004" pitchFamily="50" charset="-127"/>
+              </a:rPr>
+              <a:t>보통은 계통구조의 뿌리 좌표계가 곧 결속 공간 좌표계이다</a:t>
+            </a:r>
+            <a:r>
+              <a:rPr lang="en-US" altLang="ko-KR" baseline="0" smtClean="0">
+                <a:latin typeface="맑은 고딕" panose="020B0503020000020004" pitchFamily="50" charset="-127"/>
+                <a:ea typeface="맑은 고딕" panose="020B0503020000020004" pitchFamily="50" charset="-127"/>
+              </a:rPr>
+              <a:t>.</a:t>
+            </a:r>
+          </a:p>
+          <a:p>
+            <a:pPr rtl="0"/>
+            <a:r>
+              <a:rPr lang="ko-KR" altLang="en-US" baseline="0" smtClean="0">
+                <a:latin typeface="맑은 고딕" panose="020B0503020000020004" pitchFamily="50" charset="-127"/>
+                <a:ea typeface="맑은 고딕" panose="020B0503020000020004" pitchFamily="50" charset="-127"/>
+              </a:rPr>
+              <a:t>골격의 각 뼈대는 자신의 주변에 있는 표피 일부분의 형태와 위치에 영향을 미친다</a:t>
+            </a:r>
+            <a:r>
+              <a:rPr lang="en-US" altLang="ko-KR" baseline="0" smtClean="0">
+                <a:latin typeface="맑은 고딕" panose="020B0503020000020004" pitchFamily="50" charset="-127"/>
+                <a:ea typeface="맑은 고딕" panose="020B0503020000020004" pitchFamily="50" charset="-127"/>
+              </a:rPr>
+              <a:t>.</a:t>
+            </a:r>
+          </a:p>
+          <a:p>
+            <a:pPr rtl="0"/>
+            <a:r>
+              <a:rPr lang="ko-KR" altLang="en-US" baseline="0" smtClean="0">
+                <a:latin typeface="맑은 고딕" panose="020B0503020000020004" pitchFamily="50" charset="-127"/>
+                <a:ea typeface="맑은 고딕" panose="020B0503020000020004" pitchFamily="50" charset="-127"/>
+              </a:rPr>
+              <a:t>골격을 애니메이션하면 골격에 묶인 표피도 골격의 현재 자세에 맞게 애니메이션된다</a:t>
+            </a:r>
+            <a:r>
+              <a:rPr lang="en-US" altLang="ko-KR" baseline="0" smtClean="0">
+                <a:latin typeface="맑은 고딕" panose="020B0503020000020004" pitchFamily="50" charset="-127"/>
+                <a:ea typeface="맑은 고딕" panose="020B0503020000020004" pitchFamily="50" charset="-127"/>
+              </a:rPr>
+              <a:t>. -&gt; </a:t>
+            </a:r>
+            <a:r>
+              <a:rPr lang="ko-KR" altLang="en-US" baseline="0" smtClean="0">
+                <a:latin typeface="맑은 고딕" panose="020B0503020000020004" pitchFamily="50" charset="-127"/>
+                <a:ea typeface="맑은 고딕" panose="020B0503020000020004" pitchFamily="50" charset="-127"/>
+              </a:rPr>
+              <a:t>이 기법을 </a:t>
+            </a:r>
+            <a:r>
+              <a:rPr lang="en-US" altLang="ko-KR" baseline="0" smtClean="0">
+                <a:latin typeface="맑은 고딕" panose="020B0503020000020004" pitchFamily="50" charset="-127"/>
+                <a:ea typeface="맑은 고딕" panose="020B0503020000020004" pitchFamily="50" charset="-127"/>
+              </a:rPr>
+              <a:t>‘</a:t>
+            </a:r>
+            <a:r>
+              <a:rPr lang="ko-KR" altLang="en-US" baseline="0" smtClean="0">
+                <a:latin typeface="맑은 고딕" panose="020B0503020000020004" pitchFamily="50" charset="-127"/>
+                <a:ea typeface="맑은 고딕" panose="020B0503020000020004" pitchFamily="50" charset="-127"/>
+              </a:rPr>
+              <a:t>스키닝</a:t>
+            </a:r>
+            <a:r>
+              <a:rPr lang="en-US" altLang="ko-KR" baseline="0" smtClean="0">
+                <a:latin typeface="맑은 고딕" panose="020B0503020000020004" pitchFamily="50" charset="-127"/>
+                <a:ea typeface="맑은 고딕" panose="020B0503020000020004" pitchFamily="50" charset="-127"/>
+              </a:rPr>
+              <a:t>‘</a:t>
+            </a:r>
+            <a:r>
+              <a:rPr lang="ko-KR" altLang="en-US" baseline="0" smtClean="0">
+                <a:latin typeface="맑은 고딕" panose="020B0503020000020004" pitchFamily="50" charset="-127"/>
+                <a:ea typeface="맑은 고딕" panose="020B0503020000020004" pitchFamily="50" charset="-127"/>
+              </a:rPr>
+              <a:t>이라고 부른다</a:t>
+            </a:r>
+            <a:r>
+              <a:rPr lang="en-US" altLang="ko-KR" baseline="0" smtClean="0">
+                <a:latin typeface="맑은 고딕" panose="020B0503020000020004" pitchFamily="50" charset="-127"/>
+                <a:ea typeface="맑은 고딕" panose="020B0503020000020004" pitchFamily="50" charset="-127"/>
+              </a:rPr>
+              <a:t>.</a:t>
+            </a:r>
+            <a:endParaRPr lang="en-US" altLang="ko-KR" baseline="0" dirty="0">
               <a:latin typeface="맑은 고딕" panose="020B0503020000020004" pitchFamily="50" charset="-127"/>
               <a:ea typeface="맑은 고딕" panose="020B0503020000020004" pitchFamily="50" charset="-127"/>
             </a:endParaRPr>
@@ -1348,7 +1868,7 @@
     </p:spTree>
     <p:extLst>
       <p:ext uri="{BB962C8B-B14F-4D97-AF65-F5344CB8AC3E}">
-        <p14:creationId xmlns:p14="http://schemas.microsoft.com/office/powerpoint/2010/main" val="3663719858"/>
+        <p14:creationId xmlns:p14="http://schemas.microsoft.com/office/powerpoint/2010/main" val="351867088"/>
       </p:ext>
     </p:extLst>
   </p:cSld>
@@ -1403,7 +1923,69 @@
           <a:lstStyle/>
           <a:p>
             <a:pPr rtl="0"/>
-            <a:endParaRPr lang="ko-KR" altLang="en-US" dirty="0">
+            <a:r>
+              <a:rPr lang="ko-KR" altLang="en-US" baseline="0" smtClean="0">
+                <a:latin typeface="맑은 고딕" panose="020B0503020000020004" pitchFamily="50" charset="-127"/>
+                <a:ea typeface="맑은 고딕" panose="020B0503020000020004" pitchFamily="50" charset="-127"/>
+              </a:rPr>
+              <a:t>스키닝에서는 뿌리 좌표계에서 세계 공간 좌표계로의 변환을 개별적인 단계로 수행한다</a:t>
+            </a:r>
+            <a:r>
+              <a:rPr lang="en-US" altLang="ko-KR" baseline="0" smtClean="0">
+                <a:latin typeface="맑은 고딕" panose="020B0503020000020004" pitchFamily="50" charset="-127"/>
+                <a:ea typeface="맑은 고딕" panose="020B0503020000020004" pitchFamily="50" charset="-127"/>
+              </a:rPr>
+              <a:t>.</a:t>
+            </a:r>
+          </a:p>
+          <a:p>
+            <a:pPr rtl="0"/>
+            <a:r>
+              <a:rPr lang="ko-KR" altLang="en-US" baseline="0" smtClean="0">
+                <a:latin typeface="맑은 고딕" panose="020B0503020000020004" pitchFamily="50" charset="-127"/>
+                <a:ea typeface="맑은 고딕" panose="020B0503020000020004" pitchFamily="50" charset="-127"/>
+              </a:rPr>
+              <a:t>뿌리 공간으로의 변환 행렬을 구한다</a:t>
+            </a:r>
+            <a:r>
+              <a:rPr lang="en-US" altLang="ko-KR" baseline="0" smtClean="0">
+                <a:latin typeface="맑은 고딕" panose="020B0503020000020004" pitchFamily="50" charset="-127"/>
+                <a:ea typeface="맑은 고딕" panose="020B0503020000020004" pitchFamily="50" charset="-127"/>
+              </a:rPr>
+              <a:t>. -&gt; </a:t>
+            </a:r>
+            <a:r>
+              <a:rPr lang="ko-KR" altLang="en-US" baseline="0" smtClean="0">
+                <a:latin typeface="맑은 고딕" panose="020B0503020000020004" pitchFamily="50" charset="-127"/>
+                <a:ea typeface="맑은 고딕" panose="020B0503020000020004" pitchFamily="50" charset="-127"/>
+              </a:rPr>
+              <a:t>그러한 변환을 간단히 뿌리 변환</a:t>
+            </a:r>
+            <a:r>
+              <a:rPr lang="en-US" altLang="ko-KR" baseline="0" smtClean="0">
+                <a:latin typeface="맑은 고딕" panose="020B0503020000020004" pitchFamily="50" charset="-127"/>
+                <a:ea typeface="맑은 고딕" panose="020B0503020000020004" pitchFamily="50" charset="-127"/>
+              </a:rPr>
+              <a:t>(to-root)</a:t>
+            </a:r>
+            <a:r>
+              <a:rPr lang="ko-KR" altLang="en-US" baseline="0" smtClean="0">
+                <a:latin typeface="맑은 고딕" panose="020B0503020000020004" pitchFamily="50" charset="-127"/>
+                <a:ea typeface="맑은 고딕" panose="020B0503020000020004" pitchFamily="50" charset="-127"/>
+              </a:rPr>
+              <a:t>라고 부르기로 하겠다</a:t>
+            </a:r>
+            <a:r>
+              <a:rPr lang="en-US" altLang="ko-KR" baseline="0" smtClean="0">
+                <a:latin typeface="맑은 고딕" panose="020B0503020000020004" pitchFamily="50" charset="-127"/>
+                <a:ea typeface="맑은 고딕" panose="020B0503020000020004" pitchFamily="50" charset="-127"/>
+              </a:rPr>
+              <a:t>.</a:t>
+            </a:r>
+          </a:p>
+          <a:p>
+            <a:pPr rtl="0"/>
+            <a:endParaRPr lang="en-US" altLang="ko-KR" baseline="0" dirty="0">
               <a:latin typeface="맑은 고딕" panose="020B0503020000020004" pitchFamily="50" charset="-127"/>
               <a:ea typeface="맑은 고딕" panose="020B0503020000020004" pitchFamily="50" charset="-127"/>
             </a:endParaRPr>
@@ -1443,7 +2025,102 @@
     </p:spTree>
     <p:extLst>
       <p:ext uri="{BB962C8B-B14F-4D97-AF65-F5344CB8AC3E}">
-        <p14:creationId xmlns:p14="http://schemas.microsoft.com/office/powerpoint/2010/main" val="2871163175"/>
+        <p14:creationId xmlns:p14="http://schemas.microsoft.com/office/powerpoint/2010/main" val="4139499167"/>
+      </p:ext>
+    </p:extLst>
+  </p:cSld>
+  <p:clrMapOvr>
+    <a:masterClrMapping/>
+  </p:clrMapOvr>
+</p:notes>
+</file>
+
+<file path=ppt/notesSlides/notesSlide9.xml><?xml version="1.0" encoding="utf-8"?>
+<p:notes xmlns:a="http://schemas.openxmlformats.org/drawingml/2006/main" xmlns:r="http://schemas.openxmlformats.org/officeDocument/2006/relationships" xmlns:p="http://schemas.openxmlformats.org/presentationml/2006/main">
+  <p:cSld>
+    <p:spTree>
+      <p:nvGrpSpPr>
+        <p:cNvPr id="1" name=""/>
+        <p:cNvGrpSpPr/>
+        <p:nvPr/>
+      </p:nvGrpSpPr>
+      <p:grpSpPr>
+        <a:xfrm>
+          <a:off x="0" y="0"/>
+          <a:ext cx="0" cy="0"/>
+          <a:chOff x="0" y="0"/>
+          <a:chExt cx="0" cy="0"/>
+        </a:xfrm>
+      </p:grpSpPr>
+      <p:sp>
+        <p:nvSpPr>
+          <p:cNvPr id="2" name="슬라이드 이미지 개체 틀 1"/>
+          <p:cNvSpPr>
+            <a:spLocks noGrp="1" noRot="1" noChangeAspect="1"/>
+          </p:cNvSpPr>
+          <p:nvPr>
+            <p:ph type="sldImg"/>
+          </p:nvPr>
+        </p:nvSpPr>
+        <p:spPr/>
+      </p:sp>
+      <p:sp>
+        <p:nvSpPr>
+          <p:cNvPr id="3" name="슬라이드 노트 개체 틀 2"/>
+          <p:cNvSpPr>
+            <a:spLocks noGrp="1"/>
+          </p:cNvSpPr>
+          <p:nvPr>
+            <p:ph type="body" idx="1"/>
+          </p:nvPr>
+        </p:nvSpPr>
+        <p:spPr/>
+        <p:txBody>
+          <a:bodyPr rtlCol="0"/>
+          <a:lstStyle/>
+          <a:p>
+            <a:pPr rtl="0"/>
+            <a:endParaRPr lang="en-US" altLang="ko-KR" baseline="0" dirty="0">
+              <a:latin typeface="맑은 고딕" panose="020B0503020000020004" pitchFamily="50" charset="-127"/>
+              <a:ea typeface="맑은 고딕" panose="020B0503020000020004" pitchFamily="50" charset="-127"/>
+            </a:endParaRPr>
+          </a:p>
+        </p:txBody>
+      </p:sp>
+      <p:sp>
+        <p:nvSpPr>
+          <p:cNvPr id="4" name="슬라이드 번호 개체 틀 3"/>
+          <p:cNvSpPr>
+            <a:spLocks noGrp="1"/>
+          </p:cNvSpPr>
+          <p:nvPr>
+            <p:ph type="sldNum" sz="quarter" idx="10"/>
+          </p:nvPr>
+        </p:nvSpPr>
+        <p:spPr/>
+        <p:txBody>
+          <a:bodyPr rtlCol="0"/>
+          <a:lstStyle/>
+          <a:p>
+            <a:pPr rtl="0"/>
+            <a:fld id="{82869989-EB00-4EE7-BCB5-25BDC5BB29F8}" type="slidenum">
+              <a:rPr lang="en-US" altLang="ko-KR" smtClean="0">
+                <a:latin typeface="맑은 고딕" panose="020B0503020000020004" pitchFamily="50" charset="-127"/>
+                <a:ea typeface="맑은 고딕" panose="020B0503020000020004" pitchFamily="50" charset="-127"/>
+              </a:rPr>
+              <a:t>9</a:t>
+            </a:fld>
+            <a:endParaRPr lang="ko-KR" altLang="en-US" dirty="0">
+              <a:latin typeface="맑은 고딕" panose="020B0503020000020004" pitchFamily="50" charset="-127"/>
+              <a:ea typeface="맑은 고딕" panose="020B0503020000020004" pitchFamily="50" charset="-127"/>
+            </a:endParaRPr>
+          </a:p>
+        </p:txBody>
+      </p:sp>
+    </p:spTree>
+    <p:extLst>
+      <p:ext uri="{BB962C8B-B14F-4D97-AF65-F5344CB8AC3E}">
+        <p14:creationId xmlns:p14="http://schemas.microsoft.com/office/powerpoint/2010/main" val="148039677"/>
       </p:ext>
     </p:extLst>
   </p:cSld>
@@ -3657,7 +4334,7 @@
           <a:p>
             <a:fld id="{2A5B65E4-62A8-4988-B07B-5D6D443B14ED}" type="datetime4">
               <a:rPr lang="ko-KR" altLang="en-US" smtClean="0"/>
-              <a:t>2019년 8월 29일</a:t>
+              <a:t>2019년 8월 30일</a:t>
             </a:fld>
             <a:endParaRPr lang="ko-KR" altLang="en-US" dirty="0"/>
           </a:p>
@@ -3913,7 +4590,7 @@
           <a:p>
             <a:fld id="{58EB6286-0DE7-4336-9826-977AD102FCF2}" type="datetime4">
               <a:rPr lang="ko-KR" altLang="en-US" noProof="0" smtClean="0"/>
-              <a:t>2019년 8월 29일</a:t>
+              <a:t>2019년 8월 30일</a:t>
             </a:fld>
             <a:endParaRPr lang="ko-KR" altLang="en-US" noProof="0" dirty="0"/>
           </a:p>
@@ -4109,7 +4786,7 @@
             <a:pPr rtl="0"/>
             <a:fld id="{6A5419DA-7218-42E5-A443-F000500111E1}" type="datetime4">
               <a:rPr lang="ko-KR" altLang="en-US" noProof="0" smtClean="0"/>
-              <a:t>2019년 8월 29일</a:t>
+              <a:t>2019년 8월 30일</a:t>
             </a:fld>
             <a:endParaRPr lang="ko-KR" altLang="en-US" noProof="0" dirty="0"/>
           </a:p>
@@ -6510,7 +7187,7 @@
           <a:p>
             <a:fld id="{E498C52F-1DF1-4226-BAB6-C1E2EE4C9D62}" type="datetime4">
               <a:rPr lang="ko-KR" altLang="en-US" noProof="0" smtClean="0"/>
-              <a:t>2019년 8월 29일</a:t>
+              <a:t>2019년 8월 30일</a:t>
             </a:fld>
             <a:endParaRPr lang="ko-KR" altLang="en-US" noProof="0" dirty="0"/>
           </a:p>
@@ -7029,7 +7706,7 @@
           <a:p>
             <a:fld id="{7B1E1FFC-F755-4558-8D3C-A157D1A01A8A}" type="datetime4">
               <a:rPr lang="ko-KR" altLang="en-US" noProof="0" smtClean="0"/>
-              <a:t>2019년 8월 29일</a:t>
+              <a:t>2019년 8월 30일</a:t>
             </a:fld>
             <a:endParaRPr lang="ko-KR" altLang="en-US" noProof="0" dirty="0"/>
           </a:p>
@@ -7173,7 +7850,7 @@
             <a:pPr rtl="0"/>
             <a:fld id="{DA2A33C0-A4A8-4C90-B6DA-35B8CF58C816}" type="datetime4">
               <a:rPr lang="ko-KR" altLang="en-US" noProof="0" smtClean="0"/>
-              <a:t>2019년 8월 29일</a:t>
+              <a:t>2019년 8월 30일</a:t>
             </a:fld>
             <a:endParaRPr lang="ko-KR" altLang="en-US" noProof="0" dirty="0"/>
           </a:p>
@@ -9121,7 +9798,7 @@
           <a:p>
             <a:fld id="{53CB1B8F-A14A-4BE4-A9B9-3B263F04145C}" type="datetime4">
               <a:rPr lang="ko-KR" altLang="en-US" noProof="0" smtClean="0"/>
-              <a:t>2019년 8월 29일</a:t>
+              <a:t>2019년 8월 30일</a:t>
             </a:fld>
             <a:endParaRPr lang="ko-KR" altLang="en-US" noProof="0" dirty="0"/>
           </a:p>
@@ -11418,7 +12095,7 @@
           <a:p>
             <a:fld id="{5B9196A3-957C-4113-A568-B6ED9AEA3D01}" type="datetime4">
               <a:rPr lang="ko-KR" altLang="en-US" noProof="0" smtClean="0"/>
-              <a:t>2019년 8월 29일</a:t>
+              <a:t>2019년 8월 30일</a:t>
             </a:fld>
             <a:endParaRPr lang="ko-KR" altLang="en-US" noProof="0" dirty="0"/>
           </a:p>
@@ -15735,7 +16412,7 @@
           <a:p>
             <a:fld id="{28BEB146-D335-4DA5-9826-58595BCDBE2E}" type="datetime4">
               <a:rPr lang="ko-KR" altLang="en-US" noProof="0" smtClean="0"/>
-              <a:t>2019년 8월 29일</a:t>
+              <a:t>2019년 8월 30일</a:t>
             </a:fld>
             <a:endParaRPr lang="ko-KR" altLang="en-US" noProof="0" dirty="0"/>
           </a:p>
@@ -16281,6 +16958,356 @@
 </p:sld>
 </file>
 
+<file path=ppt/slides/slide10.xml><?xml version="1.0" encoding="utf-8"?>
+<p:sld xmlns:a="http://schemas.openxmlformats.org/drawingml/2006/main" xmlns:r="http://schemas.openxmlformats.org/officeDocument/2006/relationships" xmlns:p="http://schemas.openxmlformats.org/presentationml/2006/main">
+  <p:cSld>
+    <p:spTree>
+      <p:nvGrpSpPr>
+        <p:cNvPr id="1" name=""/>
+        <p:cNvGrpSpPr/>
+        <p:nvPr/>
+      </p:nvGrpSpPr>
+      <p:grpSpPr>
+        <a:xfrm>
+          <a:off x="0" y="0"/>
+          <a:ext cx="0" cy="0"/>
+          <a:chOff x="0" y="0"/>
+          <a:chExt cx="0" cy="0"/>
+        </a:xfrm>
+      </p:grpSpPr>
+      <p:sp>
+        <p:nvSpPr>
+          <p:cNvPr id="2" name="제목 1"/>
+          <p:cNvSpPr>
+            <a:spLocks noGrp="1"/>
+          </p:cNvSpPr>
+          <p:nvPr>
+            <p:ph type="title"/>
+          </p:nvPr>
+        </p:nvSpPr>
+        <p:spPr>
+          <a:xfrm>
+            <a:off x="1295400" y="503854"/>
+            <a:ext cx="9601200" cy="625035"/>
+          </a:xfrm>
+        </p:spPr>
+        <p:txBody>
+          <a:bodyPr rtlCol="0">
+            <a:normAutofit fontScale="90000"/>
+          </a:bodyPr>
+          <a:lstStyle/>
+          <a:p>
+            <a:pPr>
+              <a:lnSpc>
+                <a:spcPct val="100000"/>
+              </a:lnSpc>
+            </a:pPr>
+            <a:r>
+              <a:rPr lang="en-US" altLang="ko-KR" sz="3600" smtClean="0"/>
+              <a:t>23.3 </a:t>
+            </a:r>
+            <a:r>
+              <a:rPr lang="ko-KR" altLang="en-US" sz="3600" smtClean="0"/>
+              <a:t>부분집합 정의</a:t>
+            </a:r>
+            <a:endParaRPr lang="ko-KR" altLang="en-US" sz="2400" dirty="0"/>
+          </a:p>
+        </p:txBody>
+      </p:sp>
+      <p:grpSp>
+        <p:nvGrpSpPr>
+          <p:cNvPr id="4" name="그룹 3"/>
+          <p:cNvGrpSpPr/>
+          <p:nvPr/>
+        </p:nvGrpSpPr>
+        <p:grpSpPr>
+          <a:xfrm>
+            <a:off x="2272429" y="1128889"/>
+            <a:ext cx="7647142" cy="4819989"/>
+            <a:chOff x="2272429" y="1128889"/>
+            <a:chExt cx="7647142" cy="4819989"/>
+          </a:xfrm>
+        </p:grpSpPr>
+        <p:pic>
+          <p:nvPicPr>
+            <p:cNvPr id="3" name="그림 2"/>
+            <p:cNvPicPr>
+              <a:picLocks noChangeAspect="1"/>
+            </p:cNvPicPr>
+            <p:nvPr/>
+          </p:nvPicPr>
+          <p:blipFill>
+            <a:blip r:embed="rId3">
+              <a:extLst>
+                <a:ext uri="{28A0092B-C50C-407E-A947-70E740481C1C}">
+                  <a14:useLocalDpi xmlns:a14="http://schemas.microsoft.com/office/drawing/2010/main" val="0"/>
+                </a:ext>
+              </a:extLst>
+            </a:blip>
+            <a:stretch>
+              <a:fillRect/>
+            </a:stretch>
+          </p:blipFill>
+          <p:spPr>
+            <a:xfrm>
+              <a:off x="2272429" y="1128889"/>
+              <a:ext cx="7647142" cy="4496824"/>
+            </a:xfrm>
+            <a:prstGeom prst="rect">
+              <a:avLst/>
+            </a:prstGeom>
+          </p:spPr>
+        </p:pic>
+        <p:sp>
+          <p:nvSpPr>
+            <p:cNvPr id="6" name="TextBox 5">
+              <a:extLst>
+                <a:ext uri="{FF2B5EF4-FFF2-40B4-BE49-F238E27FC236}">
+                  <a16:creationId xmlns="" xmlns:a16="http://schemas.microsoft.com/office/drawing/2014/main" id="{69F81465-6DFE-4098-8458-39E005A83CA5}"/>
+                </a:ext>
+              </a:extLst>
+            </p:cNvPr>
+            <p:cNvSpPr txBox="1"/>
+            <p:nvPr/>
+          </p:nvSpPr>
+          <p:spPr>
+            <a:xfrm>
+              <a:off x="2272429" y="5625713"/>
+              <a:ext cx="5031482" cy="323165"/>
+            </a:xfrm>
+            <a:prstGeom prst="rect">
+              <a:avLst/>
+            </a:prstGeom>
+            <a:noFill/>
+            <a:ln>
+              <a:noFill/>
+            </a:ln>
+          </p:spPr>
+          <p:txBody>
+            <a:bodyPr wrap="square" rtlCol="0">
+              <a:spAutoFit/>
+            </a:bodyPr>
+            <a:lstStyle/>
+            <a:p>
+              <a:r>
+                <a:rPr lang="ko-KR" altLang="en-US" sz="1500" smtClean="0"/>
+                <a:t>그림 </a:t>
+              </a:r>
+              <a:r>
+                <a:rPr lang="en-US" altLang="ko-KR" sz="1500" dirty="0"/>
+                <a:t>9</a:t>
+              </a:r>
+              <a:r>
+                <a:rPr lang="en-US" altLang="ko-KR" sz="1500" smtClean="0"/>
+                <a:t>. </a:t>
+              </a:r>
+              <a:r>
+                <a:rPr lang="ko-KR" altLang="en-US" sz="1500" smtClean="0"/>
+                <a:t>하나의 자동차를 여러 부분집합으로 분할한 모습</a:t>
+              </a:r>
+              <a:endParaRPr lang="en-US" altLang="ko-KR" sz="1500" dirty="0"/>
+            </a:p>
+          </p:txBody>
+        </p:sp>
+      </p:grpSp>
+    </p:spTree>
+    <p:extLst>
+      <p:ext uri="{BB962C8B-B14F-4D97-AF65-F5344CB8AC3E}">
+        <p14:creationId xmlns:p14="http://schemas.microsoft.com/office/powerpoint/2010/main" val="1289418446"/>
+      </p:ext>
+    </p:extLst>
+  </p:cSld>
+  <p:clrMapOvr>
+    <a:masterClrMapping/>
+  </p:clrMapOvr>
+  <mc:AlternateContent xmlns:mc="http://schemas.openxmlformats.org/markup-compatibility/2006" xmlns:p14="http://schemas.microsoft.com/office/powerpoint/2010/main">
+    <mc:Choice Requires="p14">
+      <p:transition spd="med" p14:dur="700">
+        <p:fade/>
+      </p:transition>
+    </mc:Choice>
+    <mc:Fallback xmlns="">
+      <p:transition spd="med">
+        <p:fade/>
+      </p:transition>
+    </mc:Fallback>
+  </mc:AlternateContent>
+</p:sld>
+</file>
+
+<file path=ppt/slides/slide11.xml><?xml version="1.0" encoding="utf-8"?>
+<p:sld xmlns:a="http://schemas.openxmlformats.org/drawingml/2006/main" xmlns:r="http://schemas.openxmlformats.org/officeDocument/2006/relationships" xmlns:p="http://schemas.openxmlformats.org/presentationml/2006/main">
+  <p:cSld>
+    <p:spTree>
+      <p:nvGrpSpPr>
+        <p:cNvPr id="1" name=""/>
+        <p:cNvGrpSpPr/>
+        <p:nvPr/>
+      </p:nvGrpSpPr>
+      <p:grpSpPr>
+        <a:xfrm>
+          <a:off x="0" y="0"/>
+          <a:ext cx="0" cy="0"/>
+          <a:chOff x="0" y="0"/>
+          <a:chExt cx="0" cy="0"/>
+        </a:xfrm>
+      </p:grpSpPr>
+      <p:sp>
+        <p:nvSpPr>
+          <p:cNvPr id="2" name="제목 1"/>
+          <p:cNvSpPr>
+            <a:spLocks noGrp="1"/>
+          </p:cNvSpPr>
+          <p:nvPr>
+            <p:ph type="title"/>
+          </p:nvPr>
+        </p:nvSpPr>
+        <p:spPr>
+          <a:xfrm>
+            <a:off x="1295400" y="503854"/>
+            <a:ext cx="9601200" cy="625035"/>
+          </a:xfrm>
+        </p:spPr>
+        <p:txBody>
+          <a:bodyPr rtlCol="0">
+            <a:normAutofit fontScale="90000"/>
+          </a:bodyPr>
+          <a:lstStyle/>
+          <a:p>
+            <a:pPr>
+              <a:lnSpc>
+                <a:spcPct val="100000"/>
+              </a:lnSpc>
+            </a:pPr>
+            <a:r>
+              <a:rPr lang="en-US" altLang="ko-KR" sz="3600" smtClean="0"/>
+              <a:t>23.4 </a:t>
+            </a:r>
+            <a:r>
+              <a:rPr lang="ko-KR" altLang="en-US" sz="3600" smtClean="0"/>
+              <a:t>최종</a:t>
+            </a:r>
+            <a:endParaRPr lang="ko-KR" altLang="en-US" sz="2400" dirty="0"/>
+          </a:p>
+        </p:txBody>
+      </p:sp>
+      <p:grpSp>
+        <p:nvGrpSpPr>
+          <p:cNvPr id="5" name="그룹 4"/>
+          <p:cNvGrpSpPr/>
+          <p:nvPr/>
+        </p:nvGrpSpPr>
+        <p:grpSpPr>
+          <a:xfrm>
+            <a:off x="3239060" y="1123004"/>
+            <a:ext cx="5713880" cy="4818431"/>
+            <a:chOff x="3239060" y="1123004"/>
+            <a:chExt cx="5713880" cy="4818431"/>
+          </a:xfrm>
+        </p:grpSpPr>
+        <p:sp>
+          <p:nvSpPr>
+            <p:cNvPr id="6" name="TextBox 5">
+              <a:extLst>
+                <a:ext uri="{FF2B5EF4-FFF2-40B4-BE49-F238E27FC236}">
+                  <a16:creationId xmlns="" xmlns:a16="http://schemas.microsoft.com/office/drawing/2014/main" id="{69F81465-6DFE-4098-8458-39E005A83CA5}"/>
+                </a:ext>
+              </a:extLst>
+            </p:cNvPr>
+            <p:cNvSpPr txBox="1"/>
+            <p:nvPr/>
+          </p:nvSpPr>
+          <p:spPr>
+            <a:xfrm>
+              <a:off x="3239060" y="5618270"/>
+              <a:ext cx="5031482" cy="323165"/>
+            </a:xfrm>
+            <a:prstGeom prst="rect">
+              <a:avLst/>
+            </a:prstGeom>
+            <a:noFill/>
+            <a:ln>
+              <a:noFill/>
+            </a:ln>
+          </p:spPr>
+          <p:txBody>
+            <a:bodyPr wrap="square" rtlCol="0">
+              <a:spAutoFit/>
+            </a:bodyPr>
+            <a:lstStyle/>
+            <a:p>
+              <a:r>
+                <a:rPr lang="ko-KR" altLang="en-US" sz="1500" smtClean="0"/>
+                <a:t>그림 </a:t>
+              </a:r>
+              <a:r>
+                <a:rPr lang="en-US" altLang="ko-KR" sz="1500" smtClean="0"/>
+                <a:t>10. </a:t>
+              </a:r>
+              <a:r>
+                <a:rPr lang="ko-KR" altLang="en-US" sz="1500" smtClean="0"/>
+                <a:t>메시 스키닝 예제의 실행 모습</a:t>
+              </a:r>
+              <a:endParaRPr lang="en-US" altLang="ko-KR" sz="1500" dirty="0"/>
+            </a:p>
+          </p:txBody>
+        </p:sp>
+        <p:pic>
+          <p:nvPicPr>
+            <p:cNvPr id="4" name="그림 3"/>
+            <p:cNvPicPr>
+              <a:picLocks noChangeAspect="1"/>
+            </p:cNvPicPr>
+            <p:nvPr/>
+          </p:nvPicPr>
+          <p:blipFill>
+            <a:blip r:embed="rId3">
+              <a:extLst>
+                <a:ext uri="{28A0092B-C50C-407E-A947-70E740481C1C}">
+                  <a14:useLocalDpi xmlns:a14="http://schemas.microsoft.com/office/drawing/2010/main" val="0"/>
+                </a:ext>
+              </a:extLst>
+            </a:blip>
+            <a:stretch>
+              <a:fillRect/>
+            </a:stretch>
+          </p:blipFill>
+          <p:spPr>
+            <a:xfrm>
+              <a:off x="3239060" y="1123004"/>
+              <a:ext cx="5713880" cy="4502709"/>
+            </a:xfrm>
+            <a:prstGeom prst="rect">
+              <a:avLst/>
+            </a:prstGeom>
+          </p:spPr>
+        </p:pic>
+      </p:grpSp>
+    </p:spTree>
+    <p:extLst>
+      <p:ext uri="{BB962C8B-B14F-4D97-AF65-F5344CB8AC3E}">
+        <p14:creationId xmlns:p14="http://schemas.microsoft.com/office/powerpoint/2010/main" val="3166641303"/>
+      </p:ext>
+    </p:extLst>
+  </p:cSld>
+  <p:clrMapOvr>
+    <a:masterClrMapping/>
+  </p:clrMapOvr>
+  <mc:AlternateContent xmlns:mc="http://schemas.openxmlformats.org/markup-compatibility/2006" xmlns:p14="http://schemas.microsoft.com/office/powerpoint/2010/main">
+    <mc:Choice Requires="p14">
+      <p:transition spd="med" p14:dur="700">
+        <p:fade/>
+      </p:transition>
+    </mc:Choice>
+    <mc:Fallback xmlns="">
+      <p:transition spd="med">
+        <p:fade/>
+      </p:transition>
+    </mc:Fallback>
+  </mc:AlternateContent>
+</p:sld>
+</file>
+
 <file path=ppt/slides/slide2.xml><?xml version="1.0" encoding="utf-8"?>
 <p:sld xmlns:a="http://schemas.openxmlformats.org/drawingml/2006/main" xmlns:r="http://schemas.openxmlformats.org/officeDocument/2006/relationships" xmlns:p="http://schemas.openxmlformats.org/presentationml/2006/main">
   <p:cSld>
@@ -16308,7 +17335,12 @@
             <p:ph type="title"/>
           </p:nvPr>
         </p:nvSpPr>
-        <p:spPr/>
+        <p:spPr>
+          <a:xfrm>
+            <a:off x="1295400" y="214489"/>
+            <a:ext cx="9601200" cy="573794"/>
+          </a:xfrm>
+        </p:spPr>
         <p:txBody>
           <a:bodyPr rtlCol="0"/>
           <a:lstStyle/>
@@ -16338,15 +17370,28 @@
             <p:ph idx="1"/>
           </p:nvPr>
         </p:nvSpPr>
-        <p:spPr/>
+        <p:spPr>
+          <a:xfrm>
+            <a:off x="1295400" y="1100667"/>
+            <a:ext cx="9601200" cy="3809999"/>
+          </a:xfrm>
+        </p:spPr>
         <p:txBody>
-          <a:bodyPr rtlCol="0"/>
+          <a:bodyPr rtlCol="0">
+            <a:normAutofit lnSpcReduction="10000"/>
+          </a:bodyPr>
           <a:lstStyle/>
           <a:p>
+            <a:pPr marL="0" indent="0" rtl="0">
+              <a:buNone/>
+            </a:pPr>
+            <a:endParaRPr lang="en-US" altLang="ko-KR" smtClean="0"/>
+          </a:p>
+          <a:p>
             <a:pPr rtl="0"/>
             <a:r>
               <a:rPr lang="ko-KR" altLang="en-US" smtClean="0"/>
-              <a:t>시야 공간 변환에 깔린 수학을 개괄한다</a:t>
+              <a:t>메시 계통구조 변환에 깔린 수학과 트리 기반 메시 계통구조 운행방법</a:t>
             </a:r>
             <a:endParaRPr lang="en-US" altLang="ko-KR" smtClean="0"/>
           </a:p>
@@ -16357,12 +17402,20 @@
           <a:p>
             <a:pPr rtl="0"/>
             <a:r>
-              <a:rPr lang="en-US" altLang="ko-KR" smtClean="0"/>
-              <a:t>1</a:t>
-            </a:r>
-            <a:r>
               <a:rPr lang="ko-KR" altLang="en-US" smtClean="0"/>
-              <a:t>인칭 카메라의 전형적인 기능성을 파악한다</a:t>
+              <a:t>정점 혼합에 깔린 개념과 수학을 이해</a:t>
+            </a:r>
+            <a:endParaRPr lang="en-US" altLang="ko-KR"/>
+          </a:p>
+          <a:p>
+            <a:pPr rtl="0"/>
+            <a:endParaRPr lang="en-US" altLang="ko-KR" smtClean="0"/>
+          </a:p>
+          <a:p>
+            <a:pPr rtl="0"/>
+            <a:r>
+              <a:rPr lang="ko-KR" altLang="en-US" smtClean="0"/>
+              <a:t>파일로부터 애니메이션 자료를 적재하는 방법 파악</a:t>
             </a:r>
             <a:endParaRPr lang="en-US" altLang="ko-KR" smtClean="0"/>
           </a:p>
@@ -16374,25 +17427,17 @@
             <a:pPr rtl="0"/>
             <a:r>
               <a:rPr lang="en-US" altLang="ko-KR" smtClean="0"/>
-              <a:t>1</a:t>
+              <a:t>Direct3D</a:t>
             </a:r>
             <a:r>
               <a:rPr lang="ko-KR" altLang="en-US" smtClean="0"/>
-              <a:t>인칭 카메라를 구현하는 방법을 배운다</a:t>
-            </a:r>
-            <a:endParaRPr lang="en-US" altLang="ko-KR" smtClean="0"/>
+              <a:t>에서 캐릭터 애니메이션을 구현하는 방법을 살펴본다</a:t>
+            </a:r>
+            <a:endParaRPr lang="en-US" altLang="ko-KR"/>
           </a:p>
           <a:p>
             <a:pPr rtl="0"/>
             <a:endParaRPr lang="en-US" altLang="ko-KR" smtClean="0"/>
-          </a:p>
-          <a:p>
-            <a:pPr rtl="0"/>
-            <a:r>
-              <a:rPr lang="ko-KR" altLang="en-US" smtClean="0"/>
-              <a:t>텍스처들의 배열을 동적으로 색인화하는 방법을 이해한다</a:t>
-            </a:r>
-            <a:endParaRPr lang="en-US" altLang="ko-KR" dirty="0" smtClean="0"/>
           </a:p>
         </p:txBody>
       </p:sp>
@@ -16461,34 +17506,12 @@
           <a:lstStyle/>
           <a:p>
             <a:r>
-              <a:rPr lang="en-US" altLang="ko-KR" smtClean="0">
-                <a:latin typeface="맑은 고딕" panose="020B0503020000020004" pitchFamily="50" charset="-127"/>
-                <a:ea typeface="맑은 고딕" panose="020B0503020000020004" pitchFamily="50" charset="-127"/>
-              </a:rPr>
-              <a:t>1</a:t>
-            </a:r>
-            <a:r>
-              <a:rPr lang="ko-KR" altLang="en-US" smtClean="0">
-                <a:latin typeface="맑은 고딕" panose="020B0503020000020004" pitchFamily="50" charset="-127"/>
-                <a:ea typeface="맑은 고딕" panose="020B0503020000020004" pitchFamily="50" charset="-127"/>
-              </a:rPr>
-              <a:t>인칭 카메라 구축 </a:t>
-            </a:r>
-            <a:r>
-              <a:rPr lang="en-US" altLang="ko-KR" sz="2400" smtClean="0"/>
-              <a:t>(</a:t>
-            </a:r>
-            <a:r>
-              <a:rPr lang="en-US" altLang="ko-KR" sz="2400"/>
-              <a:t>15.1 </a:t>
-            </a:r>
-            <a:r>
-              <a:rPr lang="ko-KR" altLang="en-US" sz="2400"/>
-              <a:t>시야 변환 개괄</a:t>
-            </a:r>
-            <a:r>
-              <a:rPr lang="en-US" altLang="ko-KR" sz="2400" smtClean="0"/>
-              <a:t>)</a:t>
+              <a:rPr lang="en-US" altLang="ko-KR" smtClean="0"/>
+              <a:t>23.1 </a:t>
+            </a:r>
+            <a:r>
+              <a:rPr lang="ko-KR" altLang="en-US" smtClean="0"/>
+              <a:t>뼈대 좌표계들의 계통구조</a:t>
             </a:r>
             <a:endParaRPr lang="ko-KR" altLang="en-US" sz="2400" dirty="0"/>
           </a:p>
@@ -16506,8 +17529,8 @@
         </p:nvSpPr>
         <p:spPr>
           <a:xfrm>
-            <a:off x="1295400" y="1420092"/>
-            <a:ext cx="9601200" cy="4461163"/>
+            <a:off x="1295400" y="1411110"/>
+            <a:ext cx="9601200" cy="4210499"/>
           </a:xfrm>
         </p:spPr>
         <p:txBody>
@@ -16515,95 +17538,34 @@
           <a:lstStyle/>
           <a:p>
             <a:pPr rtl="0"/>
-            <a:endParaRPr lang="en-US" altLang="ko-KR" smtClean="0"/>
-          </a:p>
-          <a:p>
-            <a:pPr rtl="0"/>
             <a:r>
               <a:rPr lang="ko-KR" altLang="en-US" smtClean="0"/>
-              <a:t>시야 공간</a:t>
-            </a:r>
-            <a:r>
-              <a:rPr lang="en-US" altLang="ko-KR" sz="1800" smtClean="0"/>
-              <a:t>(view space)</a:t>
+              <a:t>여러 개의 부분 또는 </a:t>
+            </a:r>
+            <a:r>
+              <a:rPr lang="en-US" altLang="ko-KR" smtClean="0"/>
+              <a:t>‘</a:t>
             </a:r>
             <a:r>
               <a:rPr lang="ko-KR" altLang="en-US" smtClean="0"/>
-              <a:t>은 카메라에 부착된 좌표계</a:t>
-            </a:r>
-            <a:endParaRPr lang="en-US" altLang="ko-KR" smtClean="0"/>
-          </a:p>
-          <a:p>
-            <a:pPr rtl="0"/>
-            <a:endParaRPr lang="en-US" altLang="ko-KR" dirty="0" smtClean="0"/>
-          </a:p>
-          <a:p>
-            <a:pPr rtl="0"/>
+              <a:t>부품</a:t>
+            </a:r>
+            <a:r>
+              <a:rPr lang="en-US" altLang="ko-KR" smtClean="0"/>
+              <a:t>(part)’</a:t>
+            </a:r>
             <a:r>
               <a:rPr lang="ko-KR" altLang="en-US" smtClean="0"/>
-              <a:t>렌더링 파이프라인의 후반 단계는 장면의 정점들을 세계 공간</a:t>
-            </a:r>
-            <a:r>
-              <a:rPr lang="en-US" altLang="ko-KR" sz="1800" smtClean="0"/>
-              <a:t>(World Space)</a:t>
+              <a:t>이 일종의 부모</a:t>
+            </a:r>
+            <a:r>
+              <a:rPr lang="en-US" altLang="ko-KR" smtClean="0"/>
+              <a:t>-</a:t>
             </a:r>
             <a:r>
               <a:rPr lang="ko-KR" altLang="en-US" smtClean="0"/>
-              <a:t>이 아닌 시야 공간</a:t>
-            </a:r>
-            <a:r>
-              <a:rPr lang="en-US" altLang="ko-KR" sz="1800" smtClean="0"/>
-              <a:t>(</a:t>
-            </a:r>
-            <a:r>
-              <a:rPr lang="ko-KR" altLang="en-US" sz="1800" smtClean="0"/>
-              <a:t>카메라 좌표계</a:t>
-            </a:r>
-            <a:r>
-              <a:rPr lang="en-US" altLang="ko-KR" sz="1800" smtClean="0"/>
-              <a:t>)</a:t>
-            </a:r>
-            <a:r>
-              <a:rPr lang="ko-KR" altLang="en-US" smtClean="0"/>
-              <a:t>를 기준으로 서술하는 것이 더 편리</a:t>
-            </a:r>
-            <a:endParaRPr lang="en-US" altLang="ko-KR" smtClean="0"/>
-          </a:p>
-          <a:p>
-            <a:pPr rtl="0"/>
-            <a:endParaRPr lang="en-US" altLang="ko-KR"/>
-          </a:p>
-          <a:p>
-            <a:pPr rtl="0"/>
-            <a:r>
-              <a:rPr lang="ko-KR" altLang="en-US" smtClean="0"/>
-              <a:t>세계 공간에서 시야 공간으로의 좌표 변경 변환을 시야 변환</a:t>
-            </a:r>
-            <a:r>
-              <a:rPr lang="en-US" altLang="ko-KR" sz="1800" smtClean="0"/>
-              <a:t>(view transform)</a:t>
-            </a:r>
-            <a:br>
-              <a:rPr lang="en-US" altLang="ko-KR" sz="1800" smtClean="0"/>
-            </a:br>
-            <a:r>
-              <a:rPr lang="ko-KR" altLang="en-US" smtClean="0"/>
-              <a:t>해당 변환 행렬을 시야 행렬</a:t>
-            </a:r>
-            <a:r>
-              <a:rPr lang="en-US" altLang="ko-KR" sz="1800" smtClean="0"/>
-              <a:t>(view matrix)</a:t>
-            </a:r>
-            <a:r>
-              <a:rPr lang="ko-KR" altLang="en-US" smtClean="0"/>
-              <a:t>라고 한다</a:t>
-            </a:r>
-            <a:endParaRPr lang="en-US" altLang="ko-KR" dirty="0" smtClean="0"/>
-          </a:p>
-          <a:p>
-            <a:pPr marL="0" indent="0" rtl="0">
-              <a:buNone/>
-            </a:pPr>
+              <a:t>자식 관계로 연결된 형태</a:t>
+            </a:r>
             <a:endParaRPr lang="en-US" altLang="ko-KR" dirty="0" smtClean="0"/>
           </a:p>
           <a:p>
@@ -16612,6 +17574,103 @@
           </a:p>
         </p:txBody>
       </p:sp>
+      <p:grpSp>
+        <p:nvGrpSpPr>
+          <p:cNvPr id="6" name="그룹 5"/>
+          <p:cNvGrpSpPr/>
+          <p:nvPr/>
+        </p:nvGrpSpPr>
+        <p:grpSpPr>
+          <a:xfrm>
+            <a:off x="2449688" y="2046242"/>
+            <a:ext cx="7292624" cy="3575367"/>
+            <a:chOff x="2449688" y="2404101"/>
+            <a:chExt cx="7292624" cy="3575367"/>
+          </a:xfrm>
+        </p:grpSpPr>
+        <p:pic>
+          <p:nvPicPr>
+            <p:cNvPr id="4" name="그림 3"/>
+            <p:cNvPicPr>
+              <a:picLocks noChangeAspect="1"/>
+            </p:cNvPicPr>
+            <p:nvPr/>
+          </p:nvPicPr>
+          <p:blipFill>
+            <a:blip r:embed="rId3">
+              <a:extLst>
+                <a:ext uri="{28A0092B-C50C-407E-A947-70E740481C1C}">
+                  <a14:useLocalDpi xmlns:a14="http://schemas.microsoft.com/office/drawing/2010/main" val="0"/>
+                </a:ext>
+              </a:extLst>
+            </a:blip>
+            <a:stretch>
+              <a:fillRect/>
+            </a:stretch>
+          </p:blipFill>
+          <p:spPr>
+            <a:xfrm>
+              <a:off x="2449688" y="2404101"/>
+              <a:ext cx="7292624" cy="3285242"/>
+            </a:xfrm>
+            <a:prstGeom prst="rect">
+              <a:avLst/>
+            </a:prstGeom>
+          </p:spPr>
+        </p:pic>
+        <p:sp>
+          <p:nvSpPr>
+            <p:cNvPr id="5" name="TextBox 4">
+              <a:extLst>
+                <a:ext uri="{FF2B5EF4-FFF2-40B4-BE49-F238E27FC236}">
+                  <a16:creationId xmlns="" xmlns:a16="http://schemas.microsoft.com/office/drawing/2014/main" id="{69F81465-6DFE-4098-8458-39E005A83CA5}"/>
+                </a:ext>
+              </a:extLst>
+            </p:cNvPr>
+            <p:cNvSpPr txBox="1"/>
+            <p:nvPr/>
+          </p:nvSpPr>
+          <p:spPr>
+            <a:xfrm>
+              <a:off x="3681434" y="5656303"/>
+              <a:ext cx="4829132" cy="323165"/>
+            </a:xfrm>
+            <a:prstGeom prst="rect">
+              <a:avLst/>
+            </a:prstGeom>
+            <a:noFill/>
+            <a:ln>
+              <a:noFill/>
+            </a:ln>
+          </p:spPr>
+          <p:txBody>
+            <a:bodyPr wrap="square" rtlCol="0">
+              <a:spAutoFit/>
+            </a:bodyPr>
+            <a:lstStyle/>
+            <a:p>
+              <a:pPr algn="ctr"/>
+              <a:r>
+                <a:rPr lang="ko-KR" altLang="en-US" sz="1500" dirty="0" smtClean="0"/>
+                <a:t>그림 </a:t>
+              </a:r>
+              <a:r>
+                <a:rPr lang="en-US" altLang="ko-KR" sz="1500" dirty="0" smtClean="0"/>
+                <a:t>1</a:t>
+              </a:r>
+              <a:r>
+                <a:rPr lang="en-US" altLang="ko-KR" sz="1500" smtClean="0"/>
+                <a:t>. </a:t>
+              </a:r>
+              <a:r>
+                <a:rPr lang="ko-KR" altLang="en-US" sz="1500" smtClean="0"/>
+                <a:t>계통구조 변환</a:t>
+              </a:r>
+              <a:endParaRPr lang="en-US" altLang="ko-KR" sz="1500" dirty="0"/>
+            </a:p>
+          </p:txBody>
+        </p:sp>
+      </p:grpSp>
     </p:spTree>
     <p:extLst>
       <p:ext uri="{BB962C8B-B14F-4D97-AF65-F5344CB8AC3E}">
@@ -16677,34 +17736,12 @@
           <a:lstStyle/>
           <a:p>
             <a:r>
-              <a:rPr lang="en-US" altLang="ko-KR" smtClean="0">
-                <a:latin typeface="맑은 고딕" panose="020B0503020000020004" pitchFamily="50" charset="-127"/>
-                <a:ea typeface="맑은 고딕" panose="020B0503020000020004" pitchFamily="50" charset="-127"/>
-              </a:rPr>
-              <a:t>1</a:t>
-            </a:r>
-            <a:r>
-              <a:rPr lang="ko-KR" altLang="en-US" smtClean="0">
-                <a:latin typeface="맑은 고딕" panose="020B0503020000020004" pitchFamily="50" charset="-127"/>
-                <a:ea typeface="맑은 고딕" panose="020B0503020000020004" pitchFamily="50" charset="-127"/>
-              </a:rPr>
-              <a:t>인칭 카메라 구축 </a:t>
-            </a:r>
-            <a:r>
-              <a:rPr lang="en-US" altLang="ko-KR" sz="2400" smtClean="0"/>
-              <a:t>(</a:t>
-            </a:r>
-            <a:r>
-              <a:rPr lang="en-US" altLang="ko-KR" sz="2400"/>
-              <a:t>15.1 </a:t>
-            </a:r>
-            <a:r>
-              <a:rPr lang="ko-KR" altLang="en-US" sz="2400"/>
-              <a:t>시야 변환 개괄</a:t>
-            </a:r>
-            <a:r>
-              <a:rPr lang="en-US" altLang="ko-KR" sz="2400" smtClean="0"/>
-              <a:t>)</a:t>
+              <a:rPr lang="en-US" altLang="ko-KR" smtClean="0"/>
+              <a:t>23.1 </a:t>
+            </a:r>
+            <a:r>
+              <a:rPr lang="ko-KR" altLang="en-US" smtClean="0"/>
+              <a:t>뼈대 좌표계들의 계통구조</a:t>
             </a:r>
             <a:endParaRPr lang="ko-KR" altLang="en-US" sz="2400" dirty="0"/>
           </a:p>
@@ -16712,21 +17749,21 @@
       </p:sp>
       <p:grpSp>
         <p:nvGrpSpPr>
-          <p:cNvPr id="10" name="그룹 9"/>
+          <p:cNvPr id="9" name="그룹 8"/>
           <p:cNvGrpSpPr/>
           <p:nvPr/>
         </p:nvGrpSpPr>
         <p:grpSpPr>
           <a:xfrm>
-            <a:off x="614157" y="1911928"/>
-            <a:ext cx="5290250" cy="3733618"/>
-            <a:chOff x="614157" y="1911928"/>
-            <a:chExt cx="5290250" cy="3733618"/>
+            <a:off x="2899571" y="1689287"/>
+            <a:ext cx="6392858" cy="4270751"/>
+            <a:chOff x="2899571" y="1915065"/>
+            <a:chExt cx="6392858" cy="4270751"/>
           </a:xfrm>
         </p:grpSpPr>
         <p:pic>
           <p:nvPicPr>
-            <p:cNvPr id="4" name="그림 3"/>
+            <p:cNvPr id="7" name="그림 6"/>
             <p:cNvPicPr>
               <a:picLocks noChangeAspect="1"/>
             </p:cNvPicPr>
@@ -16746,8 +17783,8 @@
           </p:blipFill>
           <p:spPr>
             <a:xfrm>
-              <a:off x="614157" y="1911928"/>
-              <a:ext cx="5290250" cy="3158838"/>
+              <a:off x="2899571" y="1915065"/>
+              <a:ext cx="6392858" cy="3947586"/>
             </a:xfrm>
             <a:prstGeom prst="rect">
               <a:avLst/>
@@ -16756,10 +17793,10 @@
         </p:pic>
         <p:sp>
           <p:nvSpPr>
-            <p:cNvPr id="5" name="TextBox 4">
+            <p:cNvPr id="8" name="TextBox 7">
               <a:extLst>
                 <a:ext uri="{FF2B5EF4-FFF2-40B4-BE49-F238E27FC236}">
-                  <a16:creationId xmlns:a16="http://schemas.microsoft.com/office/drawing/2014/main" id="{69F81465-6DFE-4098-8458-39E005A83CA5}"/>
+                  <a16:creationId xmlns="" xmlns:a16="http://schemas.microsoft.com/office/drawing/2014/main" id="{69F81465-6DFE-4098-8458-39E005A83CA5}"/>
                 </a:ext>
               </a:extLst>
             </p:cNvPr>
@@ -16768,118 +17805,8 @@
           </p:nvSpPr>
           <p:spPr>
             <a:xfrm>
-              <a:off x="844716" y="5091548"/>
-              <a:ext cx="4829132" cy="553998"/>
-            </a:xfrm>
-            <a:prstGeom prst="rect">
-              <a:avLst/>
-            </a:prstGeom>
-            <a:noFill/>
-            <a:ln>
-              <a:noFill/>
-            </a:ln>
-          </p:spPr>
-          <p:txBody>
-            <a:bodyPr wrap="square" rtlCol="0">
-              <a:spAutoFit/>
-            </a:bodyPr>
-            <a:lstStyle/>
-            <a:p>
-              <a:pPr algn="ctr"/>
-              <a:r>
-                <a:rPr lang="ko-KR" altLang="en-US" sz="1500" dirty="0" smtClean="0"/>
-                <a:t>그림 </a:t>
-              </a:r>
-              <a:r>
-                <a:rPr lang="en-US" altLang="ko-KR" sz="1500" dirty="0" smtClean="0"/>
-                <a:t>1</a:t>
-              </a:r>
-              <a:r>
-                <a:rPr lang="en-US" altLang="ko-KR" sz="1500" smtClean="0"/>
-                <a:t>. </a:t>
-              </a:r>
-              <a:r>
-                <a:rPr lang="ko-KR" altLang="en-US" sz="1500" smtClean="0"/>
-                <a:t>카메라 좌표계</a:t>
-              </a:r>
-              <a:r>
-                <a:rPr lang="en-US" altLang="ko-KR" sz="1500" smtClean="0"/>
-                <a:t/>
-              </a:r>
-              <a:br>
-                <a:rPr lang="en-US" altLang="ko-KR" sz="1500" smtClean="0"/>
-              </a:br>
-              <a:r>
-                <a:rPr lang="ko-KR" altLang="en-US" sz="1500" smtClean="0"/>
-                <a:t>카메라는 좌표계의 원점에 놓여서 양의 </a:t>
-              </a:r>
-              <a:r>
-                <a:rPr lang="en-US" altLang="ko-KR" sz="1500" smtClean="0"/>
-                <a:t>z</a:t>
-              </a:r>
-              <a:r>
-                <a:rPr lang="ko-KR" altLang="en-US" sz="1500" smtClean="0"/>
-                <a:t>축을 바라본다</a:t>
-              </a:r>
-              <a:endParaRPr lang="en-US" altLang="ko-KR" sz="1500" dirty="0"/>
-            </a:p>
-          </p:txBody>
-        </p:sp>
-      </p:grpSp>
-      <p:grpSp>
-        <p:nvGrpSpPr>
-          <p:cNvPr id="11" name="그룹 10"/>
-          <p:cNvGrpSpPr/>
-          <p:nvPr/>
-        </p:nvGrpSpPr>
-        <p:grpSpPr>
-          <a:xfrm>
-            <a:off x="6075218" y="2680856"/>
-            <a:ext cx="5969158" cy="1944147"/>
-            <a:chOff x="6075218" y="2680856"/>
-            <a:chExt cx="5969158" cy="1944147"/>
-          </a:xfrm>
-        </p:grpSpPr>
-        <p:pic>
-          <p:nvPicPr>
-            <p:cNvPr id="8" name="그림 7"/>
-            <p:cNvPicPr>
-              <a:picLocks noChangeAspect="1"/>
-            </p:cNvPicPr>
-            <p:nvPr/>
-          </p:nvPicPr>
-          <p:blipFill>
-            <a:blip r:embed="rId4"/>
-            <a:stretch>
-              <a:fillRect/>
-            </a:stretch>
-          </p:blipFill>
-          <p:spPr>
-            <a:xfrm>
-              <a:off x="6075218" y="2680856"/>
-              <a:ext cx="5969158" cy="1620982"/>
-            </a:xfrm>
-            <a:prstGeom prst="rect">
-              <a:avLst/>
-            </a:prstGeom>
-          </p:spPr>
-        </p:pic>
-        <p:sp>
-          <p:nvSpPr>
-            <p:cNvPr id="9" name="TextBox 8">
-              <a:extLst>
-                <a:ext uri="{FF2B5EF4-FFF2-40B4-BE49-F238E27FC236}">
-                  <a16:creationId xmlns:a16="http://schemas.microsoft.com/office/drawing/2014/main" id="{69F81465-6DFE-4098-8458-39E005A83CA5}"/>
-                </a:ext>
-              </a:extLst>
-            </p:cNvPr>
-            <p:cNvSpPr txBox="1"/>
-            <p:nvPr/>
-          </p:nvSpPr>
-          <p:spPr>
-            <a:xfrm>
-              <a:off x="8132530" y="4301838"/>
-              <a:ext cx="1854533" cy="323165"/>
+              <a:off x="3681434" y="5862651"/>
+              <a:ext cx="4829132" cy="323165"/>
             </a:xfrm>
             <a:prstGeom prst="rect">
               <a:avLst/>
@@ -16910,7 +17837,7 @@
               </a:r>
               <a:r>
                 <a:rPr lang="ko-KR" altLang="en-US" sz="1500" smtClean="0"/>
-                <a:t>시야행렬</a:t>
+                <a:t>인간형 캐릭터 골격 계통구조</a:t>
               </a:r>
               <a:endParaRPr lang="en-US" altLang="ko-KR" sz="1500" dirty="0"/>
             </a:p>
@@ -16920,7 +17847,7 @@
     </p:spTree>
     <p:extLst>
       <p:ext uri="{BB962C8B-B14F-4D97-AF65-F5344CB8AC3E}">
-        <p14:creationId xmlns:p14="http://schemas.microsoft.com/office/powerpoint/2010/main" val="354460782"/>
+        <p14:creationId xmlns:p14="http://schemas.microsoft.com/office/powerpoint/2010/main" val="1632662219"/>
       </p:ext>
     </p:extLst>
   </p:cSld>
@@ -16972,134 +17899,251 @@
         <p:spPr>
           <a:xfrm>
             <a:off x="1295400" y="503854"/>
-            <a:ext cx="9601200" cy="587192"/>
+            <a:ext cx="9601200" cy="1065302"/>
           </a:xfrm>
         </p:spPr>
         <p:txBody>
           <a:bodyPr rtlCol="0">
-            <a:normAutofit/>
+            <a:normAutofit fontScale="90000"/>
           </a:bodyPr>
           <a:lstStyle/>
           <a:p>
-            <a:r>
-              <a:rPr lang="ko-KR" altLang="en-US" smtClean="0">
-                <a:latin typeface="맑은 고딕" panose="020B0503020000020004" pitchFamily="50" charset="-127"/>
-                <a:ea typeface="맑은 고딕" panose="020B0503020000020004" pitchFamily="50" charset="-127"/>
-              </a:rPr>
-              <a:t>동적 색인화</a:t>
-            </a:r>
-            <a:r>
-              <a:rPr lang="en-US" altLang="ko-KR" sz="2800" smtClean="0"/>
-              <a:t>(dynamic indexing)</a:t>
-            </a:r>
-            <a:endParaRPr lang="ko-KR" altLang="en-US" sz="2800" dirty="0"/>
+            <a:pPr>
+              <a:lnSpc>
+                <a:spcPct val="100000"/>
+              </a:lnSpc>
+            </a:pPr>
+            <a:r>
+              <a:rPr lang="en-US" altLang="ko-KR" sz="3600" smtClean="0"/>
+              <a:t>23.1 </a:t>
+            </a:r>
+            <a:r>
+              <a:rPr lang="ko-KR" altLang="en-US" sz="3600" smtClean="0"/>
+              <a:t>뼈대 좌표계들의 </a:t>
+            </a:r>
+            <a:r>
+              <a:rPr lang="ko-KR" altLang="en-US" sz="3600" smtClean="0"/>
+              <a:t>계통구조</a:t>
+            </a:r>
+            <a:r>
+              <a:rPr lang="en-US" altLang="ko-KR" smtClean="0"/>
+              <a:t/>
+            </a:r>
+            <a:br>
+              <a:rPr lang="en-US" altLang="ko-KR" smtClean="0"/>
+            </a:br>
+            <a:r>
+              <a:rPr lang="en-US" altLang="ko-KR"/>
+              <a:t>	</a:t>
+            </a:r>
+            <a:r>
+              <a:rPr lang="en-US" altLang="ko-KR" sz="2400" smtClean="0"/>
+              <a:t>23.1.1 </a:t>
+            </a:r>
+            <a:r>
+              <a:rPr lang="ko-KR" altLang="en-US" sz="2400" smtClean="0"/>
+              <a:t>수학적 정의</a:t>
+            </a:r>
+            <a:endParaRPr lang="ko-KR" altLang="en-US" sz="2400" dirty="0"/>
           </a:p>
         </p:txBody>
       </p:sp>
-      <p:sp>
-        <p:nvSpPr>
-          <p:cNvPr id="3" name="내용 개체 틀 2"/>
-          <p:cNvSpPr>
-            <a:spLocks noGrp="1"/>
-          </p:cNvSpPr>
-          <p:nvPr>
-            <p:ph idx="1"/>
-          </p:nvPr>
-        </p:nvSpPr>
-        <p:spPr>
+      <p:grpSp>
+        <p:nvGrpSpPr>
+          <p:cNvPr id="4" name="그룹 3"/>
+          <p:cNvGrpSpPr/>
+          <p:nvPr/>
+        </p:nvGrpSpPr>
+        <p:grpSpPr>
           <a:xfrm>
-            <a:off x="1295400" y="1420092"/>
-            <a:ext cx="9601200" cy="4461163"/>
+            <a:off x="2494729" y="1812819"/>
+            <a:ext cx="7202541" cy="1237773"/>
+            <a:chOff x="1862552" y="1820230"/>
+            <a:chExt cx="7202541" cy="1237773"/>
           </a:xfrm>
-        </p:spPr>
-        <p:txBody>
-          <a:bodyPr rtlCol="0"/>
-          <a:lstStyle/>
-          <a:p>
-            <a:pPr rtl="0"/>
-            <a:endParaRPr lang="en-US" altLang="ko-KR" smtClean="0"/>
-          </a:p>
-          <a:p>
-            <a:pPr rtl="0"/>
-            <a:r>
-              <a:rPr lang="ko-KR" altLang="en-US" smtClean="0"/>
-              <a:t>셰이더 프로그램 안에서 어떤 자원 배열을 말 그대로 동적으로 색인화</a:t>
-            </a:r>
-            <a:r>
-              <a:rPr lang="en-US" altLang="ko-KR" sz="1800" smtClean="0"/>
-              <a:t>(</a:t>
-            </a:r>
-            <a:r>
-              <a:rPr lang="ko-KR" altLang="en-US" sz="1800" smtClean="0"/>
-              <a:t>색인을 지정해서 특정 원소에 접근하는 것</a:t>
-            </a:r>
-            <a:r>
-              <a:rPr lang="en-US" altLang="ko-KR" sz="1800" smtClean="0"/>
-              <a:t>)</a:t>
-            </a:r>
-            <a:r>
-              <a:rPr lang="ko-KR" altLang="en-US" smtClean="0"/>
-              <a:t>하는 것</a:t>
-            </a:r>
-            <a:endParaRPr lang="en-US" altLang="ko-KR" dirty="0" smtClean="0"/>
-          </a:p>
-          <a:p>
-            <a:pPr rtl="0"/>
-            <a:r>
-              <a:rPr lang="ko-KR" altLang="en-US" smtClean="0"/>
-              <a:t>상수 버퍼의 한 요소를 색인으로 사용가능</a:t>
-            </a:r>
-          </a:p>
-          <a:p>
-            <a:pPr rtl="0"/>
-            <a:r>
-              <a:rPr lang="en-US" altLang="ko-KR" smtClean="0"/>
-              <a:t>SV_PrimitiveID, SV_VertexID, S_DispatchThreadID, SV_InstanceID</a:t>
-            </a:r>
-            <a:r>
-              <a:rPr lang="ko-KR" altLang="en-US" smtClean="0"/>
-              <a:t>같은 시스템</a:t>
-            </a:r>
-            <a:r>
-              <a:rPr lang="en-US" altLang="ko-KR" smtClean="0"/>
-              <a:t>ID</a:t>
-            </a:r>
-            <a:r>
-              <a:rPr lang="ko-KR" altLang="en-US" smtClean="0"/>
-              <a:t>를 색인으로 사용가능</a:t>
-            </a:r>
-            <a:endParaRPr lang="en-US" altLang="ko-KR" smtClean="0"/>
-          </a:p>
-          <a:p>
-            <a:pPr rtl="0"/>
-            <a:r>
-              <a:rPr lang="ko-KR" altLang="en-US" smtClean="0"/>
-              <a:t>셰이더 프로그램 안에서 수행한 어떤 계산의 결과를 색인으로 사용가능</a:t>
-            </a:r>
-            <a:endParaRPr lang="en-US" altLang="ko-KR" smtClean="0"/>
-          </a:p>
-          <a:p>
-            <a:pPr rtl="0"/>
-            <a:r>
-              <a:rPr lang="ko-KR" altLang="en-US" smtClean="0"/>
-              <a:t>텍스처에서 추출한 표본의 값을 색인으로 사용가능</a:t>
-            </a:r>
-            <a:endParaRPr lang="en-US" altLang="ko-KR" smtClean="0"/>
-          </a:p>
-          <a:p>
-            <a:pPr rtl="0"/>
-            <a:r>
-              <a:rPr lang="ko-KR" altLang="en-US" smtClean="0"/>
-              <a:t>정점 구조체의 한 성분을 색인으로 사용가능</a:t>
-            </a:r>
-            <a:endParaRPr lang="en-US" altLang="ko-KR" smtClean="0"/>
-          </a:p>
-        </p:txBody>
-      </p:sp>
+        </p:grpSpPr>
+        <p:pic>
+          <p:nvPicPr>
+            <p:cNvPr id="3" name="그림 2"/>
+            <p:cNvPicPr>
+              <a:picLocks noChangeAspect="1"/>
+            </p:cNvPicPr>
+            <p:nvPr/>
+          </p:nvPicPr>
+          <p:blipFill>
+            <a:blip r:embed="rId3">
+              <a:extLst>
+                <a:ext uri="{28A0092B-C50C-407E-A947-70E740481C1C}">
+                  <a14:useLocalDpi xmlns:a14="http://schemas.microsoft.com/office/drawing/2010/main" val="0"/>
+                </a:ext>
+              </a:extLst>
+            </a:blip>
+            <a:stretch>
+              <a:fillRect/>
+            </a:stretch>
+          </p:blipFill>
+          <p:spPr>
+            <a:xfrm>
+              <a:off x="1862552" y="1820230"/>
+              <a:ext cx="7202541" cy="914608"/>
+            </a:xfrm>
+            <a:prstGeom prst="rect">
+              <a:avLst/>
+            </a:prstGeom>
+          </p:spPr>
+        </p:pic>
+        <p:sp>
+          <p:nvSpPr>
+            <p:cNvPr id="10" name="TextBox 9">
+              <a:extLst>
+                <a:ext uri="{FF2B5EF4-FFF2-40B4-BE49-F238E27FC236}">
+                  <a16:creationId xmlns="" xmlns:a16="http://schemas.microsoft.com/office/drawing/2014/main" id="{69F81465-6DFE-4098-8458-39E005A83CA5}"/>
+                </a:ext>
+              </a:extLst>
+            </p:cNvPr>
+            <p:cNvSpPr txBox="1"/>
+            <p:nvPr/>
+          </p:nvSpPr>
+          <p:spPr>
+            <a:xfrm>
+              <a:off x="2021967" y="2734838"/>
+              <a:ext cx="4829132" cy="323165"/>
+            </a:xfrm>
+            <a:prstGeom prst="rect">
+              <a:avLst/>
+            </a:prstGeom>
+            <a:noFill/>
+            <a:ln>
+              <a:noFill/>
+            </a:ln>
+          </p:spPr>
+          <p:txBody>
+            <a:bodyPr wrap="square" rtlCol="0">
+              <a:spAutoFit/>
+            </a:bodyPr>
+            <a:lstStyle/>
+            <a:p>
+              <a:r>
+                <a:rPr lang="ko-KR" altLang="en-US" sz="1500" smtClean="0"/>
+                <a:t>그림 </a:t>
+              </a:r>
+              <a:r>
+                <a:rPr lang="en-US" altLang="ko-KR" sz="1500" dirty="0"/>
+                <a:t>3</a:t>
+              </a:r>
+              <a:r>
+                <a:rPr lang="en-US" altLang="ko-KR" sz="1500" smtClean="0"/>
+                <a:t>. </a:t>
+              </a:r>
+              <a:r>
+                <a:rPr lang="ko-KR" altLang="en-US" sz="1500" smtClean="0"/>
+                <a:t>간단한 계통구조</a:t>
+              </a:r>
+              <a:endParaRPr lang="en-US" altLang="ko-KR" sz="1500" dirty="0"/>
+            </a:p>
+          </p:txBody>
+        </p:sp>
+      </p:grpSp>
+      <p:grpSp>
+        <p:nvGrpSpPr>
+          <p:cNvPr id="6" name="그룹 5"/>
+          <p:cNvGrpSpPr/>
+          <p:nvPr/>
+        </p:nvGrpSpPr>
+        <p:grpSpPr>
+          <a:xfrm>
+            <a:off x="3694166" y="3181367"/>
+            <a:ext cx="4829132" cy="2846006"/>
+            <a:chOff x="3694166" y="3181367"/>
+            <a:chExt cx="4829132" cy="2846006"/>
+          </a:xfrm>
+        </p:grpSpPr>
+        <p:pic>
+          <p:nvPicPr>
+            <p:cNvPr id="5" name="그림 4"/>
+            <p:cNvPicPr>
+              <a:picLocks noChangeAspect="1"/>
+            </p:cNvPicPr>
+            <p:nvPr/>
+          </p:nvPicPr>
+          <p:blipFill>
+            <a:blip r:embed="rId4">
+              <a:extLst>
+                <a:ext uri="{28A0092B-C50C-407E-A947-70E740481C1C}">
+                  <a14:useLocalDpi xmlns:a14="http://schemas.microsoft.com/office/drawing/2010/main" val="0"/>
+                </a:ext>
+              </a:extLst>
+            </a:blip>
+            <a:stretch>
+              <a:fillRect/>
+            </a:stretch>
+          </p:blipFill>
+          <p:spPr>
+            <a:xfrm>
+              <a:off x="3694166" y="3181367"/>
+              <a:ext cx="4803665" cy="2522841"/>
+            </a:xfrm>
+            <a:prstGeom prst="rect">
+              <a:avLst/>
+            </a:prstGeom>
+          </p:spPr>
+        </p:pic>
+        <p:sp>
+          <p:nvSpPr>
+            <p:cNvPr id="11" name="TextBox 10">
+              <a:extLst>
+                <a:ext uri="{FF2B5EF4-FFF2-40B4-BE49-F238E27FC236}">
+                  <a16:creationId xmlns="" xmlns:a16="http://schemas.microsoft.com/office/drawing/2014/main" id="{69F81465-6DFE-4098-8458-39E005A83CA5}"/>
+                </a:ext>
+              </a:extLst>
+            </p:cNvPr>
+            <p:cNvSpPr txBox="1"/>
+            <p:nvPr/>
+          </p:nvSpPr>
+          <p:spPr>
+            <a:xfrm>
+              <a:off x="3694166" y="5704208"/>
+              <a:ext cx="4829132" cy="323165"/>
+            </a:xfrm>
+            <a:prstGeom prst="rect">
+              <a:avLst/>
+            </a:prstGeom>
+            <a:noFill/>
+            <a:ln>
+              <a:noFill/>
+            </a:ln>
+          </p:spPr>
+          <p:txBody>
+            <a:bodyPr wrap="square" rtlCol="0">
+              <a:spAutoFit/>
+            </a:bodyPr>
+            <a:lstStyle/>
+            <a:p>
+              <a:r>
+                <a:rPr lang="ko-KR" altLang="en-US" sz="1500" smtClean="0"/>
+                <a:t>그림 </a:t>
+              </a:r>
+              <a:r>
+                <a:rPr lang="en-US" altLang="ko-KR" sz="1500" dirty="0"/>
+                <a:t>4</a:t>
+              </a:r>
+              <a:r>
+                <a:rPr lang="en-US" altLang="ko-KR" sz="1500" smtClean="0"/>
+                <a:t>. </a:t>
+              </a:r>
+              <a:r>
+                <a:rPr lang="ko-KR" altLang="en-US" sz="1500" smtClean="0"/>
+                <a:t>각 뼈대의 기하구조</a:t>
+              </a:r>
+              <a:endParaRPr lang="en-US" altLang="ko-KR" sz="1500" dirty="0"/>
+            </a:p>
+          </p:txBody>
+        </p:sp>
+      </p:grpSp>
     </p:spTree>
     <p:extLst>
       <p:ext uri="{BB962C8B-B14F-4D97-AF65-F5344CB8AC3E}">
-        <p14:creationId xmlns:p14="http://schemas.microsoft.com/office/powerpoint/2010/main" val="1328155801"/>
+        <p14:creationId xmlns:p14="http://schemas.microsoft.com/office/powerpoint/2010/main" val="2386717434"/>
       </p:ext>
     </p:extLst>
   </p:cSld>
@@ -17151,116 +18195,230 @@
         <p:spPr>
           <a:xfrm>
             <a:off x="1295400" y="503854"/>
-            <a:ext cx="9601200" cy="587192"/>
+            <a:ext cx="9601200" cy="1065302"/>
           </a:xfrm>
         </p:spPr>
         <p:txBody>
           <a:bodyPr rtlCol="0">
-            <a:normAutofit/>
+            <a:normAutofit fontScale="90000"/>
           </a:bodyPr>
           <a:lstStyle/>
           <a:p>
-            <a:r>
-              <a:rPr lang="ko-KR" altLang="en-US" smtClean="0">
-                <a:latin typeface="맑은 고딕" panose="020B0503020000020004" pitchFamily="50" charset="-127"/>
-                <a:ea typeface="맑은 고딕" panose="020B0503020000020004" pitchFamily="50" charset="-127"/>
-              </a:rPr>
-              <a:t>동적 색인화</a:t>
-            </a:r>
-            <a:r>
-              <a:rPr lang="en-US" altLang="ko-KR" sz="2800" smtClean="0"/>
-              <a:t>(dynamic indexing)</a:t>
-            </a:r>
-            <a:endParaRPr lang="ko-KR" altLang="en-US" sz="2800" dirty="0"/>
+            <a:pPr>
+              <a:lnSpc>
+                <a:spcPct val="100000"/>
+              </a:lnSpc>
+            </a:pPr>
+            <a:r>
+              <a:rPr lang="en-US" altLang="ko-KR" sz="3600" smtClean="0"/>
+              <a:t>23.1 </a:t>
+            </a:r>
+            <a:r>
+              <a:rPr lang="ko-KR" altLang="en-US" sz="3600" smtClean="0"/>
+              <a:t>뼈대 좌표계들의 </a:t>
+            </a:r>
+            <a:r>
+              <a:rPr lang="ko-KR" altLang="en-US" sz="3600" smtClean="0"/>
+              <a:t>계통구조</a:t>
+            </a:r>
+            <a:r>
+              <a:rPr lang="en-US" altLang="ko-KR" smtClean="0"/>
+              <a:t/>
+            </a:r>
+            <a:br>
+              <a:rPr lang="en-US" altLang="ko-KR" smtClean="0"/>
+            </a:br>
+            <a:r>
+              <a:rPr lang="en-US" altLang="ko-KR"/>
+              <a:t>	</a:t>
+            </a:r>
+            <a:r>
+              <a:rPr lang="en-US" altLang="ko-KR" sz="2400" smtClean="0"/>
+              <a:t>23.1.1 </a:t>
+            </a:r>
+            <a:r>
+              <a:rPr lang="ko-KR" altLang="en-US" sz="2400" smtClean="0"/>
+              <a:t>수학적 정의</a:t>
+            </a:r>
+            <a:endParaRPr lang="ko-KR" altLang="en-US" sz="2400" dirty="0"/>
           </a:p>
         </p:txBody>
       </p:sp>
+      <p:grpSp>
+        <p:nvGrpSpPr>
+          <p:cNvPr id="8" name="그룹 7"/>
+          <p:cNvGrpSpPr/>
+          <p:nvPr/>
+        </p:nvGrpSpPr>
+        <p:grpSpPr>
+          <a:xfrm>
+            <a:off x="2915132" y="2289799"/>
+            <a:ext cx="6361736" cy="3666689"/>
+            <a:chOff x="2750132" y="1662484"/>
+            <a:chExt cx="6691735" cy="3856889"/>
+          </a:xfrm>
+        </p:grpSpPr>
+        <p:sp>
+          <p:nvSpPr>
+            <p:cNvPr id="11" name="TextBox 10">
+              <a:extLst>
+                <a:ext uri="{FF2B5EF4-FFF2-40B4-BE49-F238E27FC236}">
+                  <a16:creationId xmlns="" xmlns:a16="http://schemas.microsoft.com/office/drawing/2014/main" id="{69F81465-6DFE-4098-8458-39E005A83CA5}"/>
+                </a:ext>
+              </a:extLst>
+            </p:cNvPr>
+            <p:cNvSpPr txBox="1"/>
+            <p:nvPr/>
+          </p:nvSpPr>
+          <p:spPr>
+            <a:xfrm>
+              <a:off x="2750132" y="5196208"/>
+              <a:ext cx="4829132" cy="323165"/>
+            </a:xfrm>
+            <a:prstGeom prst="rect">
+              <a:avLst/>
+            </a:prstGeom>
+            <a:noFill/>
+            <a:ln>
+              <a:noFill/>
+            </a:ln>
+          </p:spPr>
+          <p:txBody>
+            <a:bodyPr wrap="square" rtlCol="0">
+              <a:spAutoFit/>
+            </a:bodyPr>
+            <a:lstStyle/>
+            <a:p>
+              <a:r>
+                <a:rPr lang="ko-KR" altLang="en-US" sz="1500" smtClean="0"/>
+                <a:t>그림 </a:t>
+              </a:r>
+              <a:r>
+                <a:rPr lang="en-US" altLang="ko-KR" sz="1500" dirty="0"/>
+                <a:t>5</a:t>
+              </a:r>
+              <a:r>
+                <a:rPr lang="en-US" altLang="ko-KR" sz="1500" smtClean="0"/>
+                <a:t>. </a:t>
+              </a:r>
+              <a:r>
+                <a:rPr lang="ko-KR" altLang="en-US" sz="1500" smtClean="0"/>
+                <a:t>계통구조의 좌표계</a:t>
+              </a:r>
+              <a:endParaRPr lang="en-US" altLang="ko-KR" sz="1500" dirty="0"/>
+            </a:p>
+          </p:txBody>
+        </p:sp>
+        <p:pic>
+          <p:nvPicPr>
+            <p:cNvPr id="7" name="그림 6"/>
+            <p:cNvPicPr>
+              <a:picLocks noChangeAspect="1"/>
+            </p:cNvPicPr>
+            <p:nvPr/>
+          </p:nvPicPr>
+          <p:blipFill>
+            <a:blip r:embed="rId3">
+              <a:extLst>
+                <a:ext uri="{28A0092B-C50C-407E-A947-70E740481C1C}">
+                  <a14:useLocalDpi xmlns:a14="http://schemas.microsoft.com/office/drawing/2010/main" val="0"/>
+                </a:ext>
+              </a:extLst>
+            </a:blip>
+            <a:stretch>
+              <a:fillRect/>
+            </a:stretch>
+          </p:blipFill>
+          <p:spPr>
+            <a:xfrm>
+              <a:off x="2750132" y="1662484"/>
+              <a:ext cx="6691735" cy="3533724"/>
+            </a:xfrm>
+            <a:prstGeom prst="rect">
+              <a:avLst/>
+            </a:prstGeom>
+          </p:spPr>
+        </p:pic>
+      </p:grpSp>
       <p:sp>
         <p:nvSpPr>
-          <p:cNvPr id="3" name="내용 개체 틀 2"/>
-          <p:cNvSpPr>
-            <a:spLocks noGrp="1"/>
-          </p:cNvSpPr>
-          <p:nvPr>
-            <p:ph idx="1"/>
-          </p:nvPr>
+          <p:cNvPr id="12" name="TextBox 11">
+            <a:extLst>
+              <a:ext uri="{FF2B5EF4-FFF2-40B4-BE49-F238E27FC236}">
+                <a16:creationId xmlns="" xmlns:a16="http://schemas.microsoft.com/office/drawing/2014/main" id="{69F81465-6DFE-4098-8458-39E005A83CA5}"/>
+              </a:ext>
+            </a:extLst>
+          </p:cNvPr>
+          <p:cNvSpPr txBox="1"/>
+          <p:nvPr/>
         </p:nvSpPr>
         <p:spPr>
           <a:xfrm>
-            <a:off x="1295400" y="1773382"/>
-            <a:ext cx="10093036" cy="3827317"/>
+            <a:off x="2915132" y="1698645"/>
+            <a:ext cx="5111268" cy="461665"/>
           </a:xfrm>
+          <a:prstGeom prst="rect">
+            <a:avLst/>
+          </a:prstGeom>
+          <a:noFill/>
+          <a:ln>
+            <a:noFill/>
+          </a:ln>
         </p:spPr>
         <p:txBody>
-          <a:bodyPr rtlCol="0"/>
+          <a:bodyPr wrap="square" rtlCol="0">
+            <a:spAutoFit/>
+          </a:bodyPr>
           <a:lstStyle/>
           <a:p>
-            <a:pPr marL="0" indent="0" rtl="0">
-              <a:buNone/>
-            </a:pPr>
-            <a:r>
-              <a:rPr lang="en-US" altLang="ko-KR" smtClean="0"/>
-              <a:t>Cbuffer cbPerDrawIndex : register(b0){</a:t>
-            </a:r>
-          </a:p>
-          <a:p>
-            <a:pPr marL="0" indent="0" rtl="0">
-              <a:buNone/>
-            </a:pPr>
-            <a:r>
-              <a:rPr lang="en-US" altLang="ko-KR" smtClean="0"/>
-              <a:t> int gDiffuseTexIndex; </a:t>
-            </a:r>
-          </a:p>
-          <a:p>
-            <a:pPr marL="0" indent="0" rtl="0">
-              <a:buNone/>
-            </a:pPr>
-            <a:r>
-              <a:rPr lang="en-US" altLang="ko-KR" smtClean="0"/>
-              <a:t>};</a:t>
-            </a:r>
-          </a:p>
-          <a:p>
-            <a:pPr marL="0" indent="0" rtl="0">
-              <a:buNone/>
-            </a:pPr>
-            <a:endParaRPr lang="en-US" altLang="ko-KR"/>
-          </a:p>
-          <a:p>
-            <a:pPr marL="0" indent="0" rtl="0">
-              <a:buNone/>
-            </a:pPr>
-            <a:r>
-              <a:rPr lang="en-US" altLang="ko-KR" smtClean="0"/>
-              <a:t>Texture2D gDiffuseMap[4] : register(t0);</a:t>
-            </a:r>
-          </a:p>
-          <a:p>
-            <a:pPr marL="0" indent="0" rtl="0">
-              <a:buNone/>
-            </a:pPr>
-            <a:endParaRPr lang="en-US" altLang="ko-KR"/>
-          </a:p>
-          <a:p>
-            <a:pPr marL="0" indent="0" rtl="0">
-              <a:buNone/>
-            </a:pPr>
-            <a:r>
-              <a:rPr lang="en-US" altLang="ko-KR"/>
-              <a:t>f</a:t>
-            </a:r>
-            <a:r>
-              <a:rPr lang="en-US" altLang="ko-KR" smtClean="0"/>
-              <a:t>loat4 texValue = gDiffuseMap[gDiffuseTexIndex].Sample(gsamLinearWrap, pin.TexC);</a:t>
-            </a:r>
+            <a:r>
+              <a:rPr lang="en-US" altLang="ko-KR" sz="2400" smtClean="0"/>
+              <a:t>M</a:t>
+            </a:r>
+            <a:r>
+              <a:rPr lang="en-US" altLang="ko-KR" sz="1600" smtClean="0"/>
+              <a:t>i</a:t>
+            </a:r>
+            <a:r>
+              <a:rPr lang="en-US" altLang="ko-KR" sz="2400" smtClean="0"/>
+              <a:t> = A</a:t>
+            </a:r>
+            <a:r>
+              <a:rPr lang="en-US" altLang="ko-KR" sz="1600" smtClean="0"/>
+              <a:t>i</a:t>
+            </a:r>
+            <a:r>
+              <a:rPr lang="en-US" altLang="ko-KR" sz="2400" smtClean="0"/>
+              <a:t>A</a:t>
+            </a:r>
+            <a:r>
+              <a:rPr lang="en-US" altLang="ko-KR" sz="1600" smtClean="0"/>
+              <a:t>i-1</a:t>
+            </a:r>
+            <a:r>
+              <a:rPr lang="en-US" altLang="ko-KR" sz="2400" smtClean="0"/>
+              <a:t>… A</a:t>
+            </a:r>
+            <a:r>
+              <a:rPr lang="en-US" altLang="ko-KR" sz="1600" smtClean="0"/>
+              <a:t>1</a:t>
+            </a:r>
+            <a:r>
+              <a:rPr lang="en-US" altLang="ko-KR" sz="2400" smtClean="0"/>
+              <a:t>A</a:t>
+            </a:r>
+            <a:r>
+              <a:rPr lang="en-US" altLang="ko-KR" sz="1600" smtClean="0"/>
+              <a:t>0</a:t>
+            </a:r>
+            <a:endParaRPr lang="en-US" altLang="ko-KR" sz="1600" dirty="0"/>
           </a:p>
         </p:txBody>
       </p:sp>
     </p:spTree>
     <p:extLst>
       <p:ext uri="{BB962C8B-B14F-4D97-AF65-F5344CB8AC3E}">
-        <p14:creationId xmlns:p14="http://schemas.microsoft.com/office/powerpoint/2010/main" val="1563487484"/>
+        <p14:creationId xmlns:p14="http://schemas.microsoft.com/office/powerpoint/2010/main" val="2112299399"/>
       </p:ext>
     </p:extLst>
   </p:cSld>
@@ -17312,141 +18470,240 @@
         <p:spPr>
           <a:xfrm>
             <a:off x="1295400" y="503854"/>
-            <a:ext cx="9601200" cy="587192"/>
+            <a:ext cx="9601200" cy="625035"/>
           </a:xfrm>
         </p:spPr>
         <p:txBody>
           <a:bodyPr rtlCol="0">
-            <a:normAutofit/>
+            <a:normAutofit fontScale="90000"/>
           </a:bodyPr>
           <a:lstStyle/>
           <a:p>
-            <a:r>
-              <a:rPr lang="ko-KR" altLang="en-US" smtClean="0">
-                <a:latin typeface="맑은 고딕" panose="020B0503020000020004" pitchFamily="50" charset="-127"/>
-                <a:ea typeface="맑은 고딕" panose="020B0503020000020004" pitchFamily="50" charset="-127"/>
-              </a:rPr>
-              <a:t>동적 색인화</a:t>
-            </a:r>
-            <a:r>
-              <a:rPr lang="en-US" altLang="ko-KR" sz="2800"/>
-              <a:t>(dynamic indexing)</a:t>
-            </a:r>
-            <a:r>
-              <a:rPr lang="ko-KR" altLang="en-US" smtClean="0">
-                <a:latin typeface="맑은 고딕" panose="020B0503020000020004" pitchFamily="50" charset="-127"/>
-                <a:ea typeface="맑은 고딕" panose="020B0503020000020004" pitchFamily="50" charset="-127"/>
-              </a:rPr>
-              <a:t>의 또 다른 용도</a:t>
-            </a:r>
-            <a:endParaRPr lang="ko-KR" altLang="en-US" sz="2800" dirty="0"/>
+            <a:pPr>
+              <a:lnSpc>
+                <a:spcPct val="100000"/>
+              </a:lnSpc>
+            </a:pPr>
+            <a:r>
+              <a:rPr lang="en-US" altLang="ko-KR" sz="3600" smtClean="0"/>
+              <a:t>23.2 </a:t>
+            </a:r>
+            <a:r>
+              <a:rPr lang="ko-KR" altLang="en-US" sz="3600" smtClean="0"/>
+              <a:t>메시 스키닝</a:t>
+            </a:r>
+            <a:endParaRPr lang="ko-KR" altLang="en-US" sz="2400" dirty="0"/>
           </a:p>
         </p:txBody>
       </p:sp>
+      <p:grpSp>
+        <p:nvGrpSpPr>
+          <p:cNvPr id="5" name="그룹 4"/>
+          <p:cNvGrpSpPr/>
+          <p:nvPr/>
+        </p:nvGrpSpPr>
+        <p:grpSpPr>
+          <a:xfrm>
+            <a:off x="632178" y="1430896"/>
+            <a:ext cx="4459111" cy="3517375"/>
+            <a:chOff x="3352800" y="1708951"/>
+            <a:chExt cx="5486400" cy="4327707"/>
+          </a:xfrm>
+        </p:grpSpPr>
+        <p:pic>
+          <p:nvPicPr>
+            <p:cNvPr id="6" name="그림 5"/>
+            <p:cNvPicPr>
+              <a:picLocks noChangeAspect="1"/>
+            </p:cNvPicPr>
+            <p:nvPr/>
+          </p:nvPicPr>
+          <p:blipFill>
+            <a:blip r:embed="rId3">
+              <a:extLst>
+                <a:ext uri="{28A0092B-C50C-407E-A947-70E740481C1C}">
+                  <a14:useLocalDpi xmlns:a14="http://schemas.microsoft.com/office/drawing/2010/main" val="0"/>
+                </a:ext>
+              </a:extLst>
+            </a:blip>
+            <a:stretch>
+              <a:fillRect/>
+            </a:stretch>
+          </p:blipFill>
+          <p:spPr>
+            <a:xfrm>
+              <a:off x="3352800" y="1708951"/>
+              <a:ext cx="5486400" cy="4004542"/>
+            </a:xfrm>
+            <a:prstGeom prst="rect">
+              <a:avLst/>
+            </a:prstGeom>
+          </p:spPr>
+        </p:pic>
+        <p:sp>
+          <p:nvSpPr>
+            <p:cNvPr id="7" name="TextBox 6">
+              <a:extLst>
+                <a:ext uri="{FF2B5EF4-FFF2-40B4-BE49-F238E27FC236}">
+                  <a16:creationId xmlns="" xmlns:a16="http://schemas.microsoft.com/office/drawing/2014/main" id="{69F81465-6DFE-4098-8458-39E005A83CA5}"/>
+                </a:ext>
+              </a:extLst>
+            </p:cNvPr>
+            <p:cNvSpPr txBox="1"/>
+            <p:nvPr/>
+          </p:nvSpPr>
+          <p:spPr>
+            <a:xfrm>
+              <a:off x="3352800" y="5713493"/>
+              <a:ext cx="4590986" cy="323165"/>
+            </a:xfrm>
+            <a:prstGeom prst="rect">
+              <a:avLst/>
+            </a:prstGeom>
+            <a:noFill/>
+            <a:ln>
+              <a:noFill/>
+            </a:ln>
+          </p:spPr>
+          <p:txBody>
+            <a:bodyPr wrap="square" rtlCol="0">
+              <a:spAutoFit/>
+            </a:bodyPr>
+            <a:lstStyle/>
+            <a:p>
+              <a:r>
+                <a:rPr lang="ko-KR" altLang="en-US" sz="1500" smtClean="0"/>
+                <a:t>그림 </a:t>
+              </a:r>
+              <a:r>
+                <a:rPr lang="en-US" altLang="ko-KR" sz="1500" dirty="0"/>
+                <a:t>6</a:t>
+              </a:r>
+              <a:r>
+                <a:rPr lang="en-US" altLang="ko-KR" sz="1500" smtClean="0"/>
+                <a:t>. </a:t>
+              </a:r>
+              <a:r>
+                <a:rPr lang="ko-KR" altLang="en-US" sz="1500" smtClean="0"/>
+                <a:t>캐릭터 메시</a:t>
+              </a:r>
+              <a:endParaRPr lang="en-US" altLang="ko-KR" sz="1500" dirty="0"/>
+            </a:p>
+          </p:txBody>
+        </p:sp>
+      </p:grpSp>
       <p:sp>
         <p:nvSpPr>
-          <p:cNvPr id="3" name="내용 개체 틀 2"/>
-          <p:cNvSpPr>
-            <a:spLocks noGrp="1"/>
-          </p:cNvSpPr>
-          <p:nvPr>
-            <p:ph idx="1"/>
-          </p:nvPr>
+          <p:cNvPr id="8" name="TextBox 7">
+            <a:extLst>
+              <a:ext uri="{FF2B5EF4-FFF2-40B4-BE49-F238E27FC236}">
+                <a16:creationId xmlns="" xmlns:a16="http://schemas.microsoft.com/office/drawing/2014/main" id="{69F81465-6DFE-4098-8458-39E005A83CA5}"/>
+              </a:ext>
+            </a:extLst>
+          </p:cNvPr>
+          <p:cNvSpPr txBox="1"/>
+          <p:nvPr/>
         </p:nvSpPr>
         <p:spPr>
           <a:xfrm>
-            <a:off x="1295399" y="1420092"/>
-            <a:ext cx="9874827" cy="4461163"/>
+            <a:off x="5455131" y="1430896"/>
+            <a:ext cx="6070825" cy="1631216"/>
           </a:xfrm>
+          <a:prstGeom prst="rect">
+            <a:avLst/>
+          </a:prstGeom>
+          <a:noFill/>
+          <a:ln>
+            <a:noFill/>
+          </a:ln>
         </p:spPr>
         <p:txBody>
-          <a:bodyPr rtlCol="0"/>
+          <a:bodyPr wrap="square" rtlCol="0">
+            <a:spAutoFit/>
+          </a:bodyPr>
           <a:lstStyle/>
           <a:p>
-            <a:pPr rtl="0"/>
-            <a:endParaRPr lang="en-US" altLang="ko-KR" smtClean="0"/>
+            <a:r>
+              <a:rPr lang="ko-KR" altLang="en-US" sz="2000" smtClean="0"/>
+              <a:t>골격</a:t>
+            </a:r>
+            <a:r>
+              <a:rPr lang="en-US" altLang="ko-KR" sz="2000" smtClean="0"/>
+              <a:t>(Skeleton) : </a:t>
+            </a:r>
+            <a:r>
+              <a:rPr lang="ko-KR" altLang="en-US" sz="2000" smtClean="0"/>
+              <a:t>흰색으로 강조된 뼈대들의 사슬</a:t>
+            </a:r>
+            <a:endParaRPr lang="en-US" altLang="ko-KR" sz="2000" smtClean="0"/>
           </a:p>
           <a:p>
-            <a:pPr rtl="0"/>
-            <a:r>
-              <a:rPr lang="ko-KR" altLang="en-US" smtClean="0"/>
-              <a:t>인접한</a:t>
-            </a:r>
-            <a:r>
-              <a:rPr lang="en-US" altLang="ko-KR" smtClean="0"/>
-              <a:t>, </a:t>
-            </a:r>
-            <a:r>
-              <a:rPr lang="ko-KR" altLang="en-US" smtClean="0"/>
-              <a:t>그러나 텍스처가 다른 여러 메시를 하나의 렌더 항목으로 병합해서 한 번의 그리기 호출로 그린다</a:t>
-            </a:r>
-            <a:r>
-              <a:rPr lang="en-US" altLang="ko-KR" smtClean="0"/>
-              <a:t>. </a:t>
-            </a:r>
-            <a:r>
-              <a:rPr lang="ko-KR" altLang="en-US" smtClean="0"/>
-              <a:t>각 메시에 적용할 텍스처</a:t>
-            </a:r>
-            <a:r>
-              <a:rPr lang="en-US" altLang="ko-KR" smtClean="0"/>
-              <a:t>/</a:t>
-            </a:r>
-            <a:r>
-              <a:rPr lang="ko-KR" altLang="en-US" smtClean="0"/>
-              <a:t>재질 정보는 메시 정점 구조체의 한 특성에 담으면 될 것</a:t>
-            </a:r>
-            <a:endParaRPr lang="en-US" altLang="ko-KR" smtClean="0"/>
+            <a:endParaRPr lang="en-US" altLang="ko-KR" sz="2000"/>
           </a:p>
           <a:p>
-            <a:pPr rtl="0"/>
-            <a:endParaRPr lang="en-US" altLang="ko-KR"/>
+            <a:r>
+              <a:rPr lang="ko-KR" altLang="en-US" sz="2000" smtClean="0"/>
+              <a:t>결속 공간</a:t>
+            </a:r>
+            <a:r>
+              <a:rPr lang="en-US" altLang="ko-KR" sz="2000" smtClean="0"/>
+              <a:t>(bind space) : </a:t>
+            </a:r>
+            <a:r>
+              <a:rPr lang="ko-KR" altLang="en-US" sz="2000" smtClean="0"/>
+              <a:t>골격과 피부</a:t>
+            </a:r>
+            <a:r>
+              <a:rPr lang="en-US" altLang="ko-KR" sz="2000" smtClean="0"/>
+              <a:t>(skin)</a:t>
+            </a:r>
+            <a:r>
+              <a:rPr lang="ko-KR" altLang="en-US" sz="2000" smtClean="0"/>
+              <a:t>를</a:t>
+            </a:r>
+            <a:endParaRPr lang="en-US" altLang="ko-KR" sz="2000" smtClean="0"/>
           </a:p>
           <a:p>
-            <a:pPr rtl="0"/>
-            <a:r>
-              <a:rPr lang="ko-KR" altLang="en-US" smtClean="0"/>
-              <a:t>크기와 형식이 다른 여러 텍스처를 한 번의 렌더링 패스로 적용</a:t>
-            </a:r>
-            <a:r>
-              <a:rPr lang="en-US" altLang="ko-KR" sz="1800" smtClean="0"/>
-              <a:t>(</a:t>
-            </a:r>
-            <a:r>
-              <a:rPr lang="ko-KR" altLang="en-US" sz="1800" smtClean="0"/>
-              <a:t>다중 텍스처 적용</a:t>
-            </a:r>
-            <a:r>
-              <a:rPr lang="en-US" altLang="ko-KR" sz="1800" smtClean="0"/>
-              <a:t>)</a:t>
-            </a:r>
-          </a:p>
-          <a:p>
-            <a:pPr rtl="0"/>
-            <a:endParaRPr lang="en-US" altLang="ko-KR" sz="1800"/>
-          </a:p>
-          <a:p>
-            <a:pPr rtl="0"/>
-            <a:r>
-              <a:rPr lang="ko-KR" altLang="en-US" smtClean="0"/>
-              <a:t>텍스처와 재질이 서로 다른 여러 렌더 항목을</a:t>
-            </a:r>
-            <a:r>
-              <a:rPr lang="en-US" altLang="ko-KR" smtClean="0"/>
-              <a:t>, SV_InstanceID </a:t>
-            </a:r>
-            <a:r>
-              <a:rPr lang="ko-KR" altLang="en-US" smtClean="0"/>
-              <a:t>값을 색인으로 사용해서 인스턴싱한다</a:t>
-            </a:r>
-            <a:endParaRPr lang="en-US" altLang="ko-KR" dirty="0" smtClean="0"/>
+            <a:r>
+              <a:rPr lang="ko-KR" altLang="en-US" sz="2000" smtClean="0"/>
+              <a:t>연관시키는</a:t>
+            </a:r>
+            <a:r>
+              <a:rPr lang="en-US" altLang="ko-KR" sz="2000" smtClean="0"/>
+              <a:t>, </a:t>
+            </a:r>
+            <a:r>
+              <a:rPr lang="ko-KR" altLang="en-US" sz="2000" smtClean="0"/>
+              <a:t>즉 골격에 피부를 묶는</a:t>
+            </a:r>
+            <a:r>
+              <a:rPr lang="en-US" altLang="ko-KR" sz="2000" smtClean="0"/>
+              <a:t>(bind) </a:t>
+            </a:r>
+            <a:r>
+              <a:rPr lang="ko-KR" altLang="en-US" sz="2000" smtClean="0"/>
+              <a:t>작업을</a:t>
+            </a:r>
+            <a:r>
+              <a:rPr lang="en-US" altLang="ko-KR" sz="2000"/>
+              <a:t> </a:t>
+            </a:r>
+            <a:r>
+              <a:rPr lang="ko-KR" altLang="en-US" sz="2000" smtClean="0"/>
+              <a:t>진행할때 기준이 되는 자세</a:t>
+            </a:r>
+            <a:r>
+              <a:rPr lang="en-US" altLang="ko-KR" sz="2000" smtClean="0"/>
+              <a:t>(pose)</a:t>
+            </a:r>
+            <a:endParaRPr lang="en-US" altLang="ko-KR" sz="2000" dirty="0"/>
           </a:p>
         </p:txBody>
       </p:sp>
     </p:spTree>
     <p:extLst>
       <p:ext uri="{BB962C8B-B14F-4D97-AF65-F5344CB8AC3E}">
-        <p14:creationId xmlns:p14="http://schemas.microsoft.com/office/powerpoint/2010/main" val="4124902655"/>
+        <p14:creationId xmlns:p14="http://schemas.microsoft.com/office/powerpoint/2010/main" val="3257280013"/>
       </p:ext>
     </p:extLst>
   </p:cSld>
@@ -17498,143 +18755,309 @@
         <p:spPr>
           <a:xfrm>
             <a:off x="1295400" y="503854"/>
-            <a:ext cx="9601200" cy="587192"/>
+            <a:ext cx="9601200" cy="625035"/>
           </a:xfrm>
         </p:spPr>
         <p:txBody>
           <a:bodyPr rtlCol="0">
-            <a:normAutofit/>
+            <a:normAutofit fontScale="90000"/>
           </a:bodyPr>
           <a:lstStyle/>
           <a:p>
-            <a:r>
-              <a:rPr lang="ko-KR" altLang="en-US" smtClean="0">
-                <a:latin typeface="맑은 고딕" panose="020B0503020000020004" pitchFamily="50" charset="-127"/>
-                <a:ea typeface="맑은 고딕" panose="020B0503020000020004" pitchFamily="50" charset="-127"/>
-              </a:rPr>
-              <a:t>요약</a:t>
-            </a:r>
-            <a:r>
-              <a:rPr lang="en-US" altLang="ko-KR" sz="2800" smtClean="0"/>
-              <a:t>(Summary)</a:t>
-            </a:r>
-            <a:endParaRPr lang="ko-KR" altLang="en-US" sz="2800" dirty="0"/>
+            <a:pPr>
+              <a:lnSpc>
+                <a:spcPct val="100000"/>
+              </a:lnSpc>
+            </a:pPr>
+            <a:r>
+              <a:rPr lang="en-US" altLang="ko-KR" sz="3600" smtClean="0"/>
+              <a:t>23.2.1 </a:t>
+            </a:r>
+            <a:r>
+              <a:rPr lang="ko-KR" altLang="en-US" sz="3600" smtClean="0"/>
+              <a:t>뿌리 변환의 재정의</a:t>
+            </a:r>
+            <a:endParaRPr lang="ko-KR" altLang="en-US" sz="2400" dirty="0"/>
           </a:p>
         </p:txBody>
       </p:sp>
+      <p:grpSp>
+        <p:nvGrpSpPr>
+          <p:cNvPr id="4" name="그룹 3"/>
+          <p:cNvGrpSpPr/>
+          <p:nvPr/>
+        </p:nvGrpSpPr>
+        <p:grpSpPr>
+          <a:xfrm>
+            <a:off x="901065" y="1919111"/>
+            <a:ext cx="10389869" cy="2970658"/>
+            <a:chOff x="901065" y="1919111"/>
+            <a:chExt cx="10389869" cy="2970658"/>
+          </a:xfrm>
+        </p:grpSpPr>
+        <p:pic>
+          <p:nvPicPr>
+            <p:cNvPr id="3" name="그림 2"/>
+            <p:cNvPicPr>
+              <a:picLocks noChangeAspect="1"/>
+            </p:cNvPicPr>
+            <p:nvPr/>
+          </p:nvPicPr>
+          <p:blipFill>
+            <a:blip r:embed="rId3">
+              <a:extLst>
+                <a:ext uri="{28A0092B-C50C-407E-A947-70E740481C1C}">
+                  <a14:useLocalDpi xmlns:a14="http://schemas.microsoft.com/office/drawing/2010/main" val="0"/>
+                </a:ext>
+              </a:extLst>
+            </a:blip>
+            <a:stretch>
+              <a:fillRect/>
+            </a:stretch>
+          </p:blipFill>
+          <p:spPr>
+            <a:xfrm>
+              <a:off x="901065" y="1919111"/>
+              <a:ext cx="10389869" cy="2647493"/>
+            </a:xfrm>
+            <a:prstGeom prst="rect">
+              <a:avLst/>
+            </a:prstGeom>
+          </p:spPr>
+        </p:pic>
+        <p:sp>
+          <p:nvSpPr>
+            <p:cNvPr id="9" name="TextBox 8">
+              <a:extLst>
+                <a:ext uri="{FF2B5EF4-FFF2-40B4-BE49-F238E27FC236}">
+                  <a16:creationId xmlns="" xmlns:a16="http://schemas.microsoft.com/office/drawing/2014/main" id="{69F81465-6DFE-4098-8458-39E005A83CA5}"/>
+                </a:ext>
+              </a:extLst>
+            </p:cNvPr>
+            <p:cNvSpPr txBox="1"/>
+            <p:nvPr/>
+          </p:nvSpPr>
+          <p:spPr>
+            <a:xfrm>
+              <a:off x="901065" y="4566604"/>
+              <a:ext cx="3731357" cy="323165"/>
+            </a:xfrm>
+            <a:prstGeom prst="rect">
+              <a:avLst/>
+            </a:prstGeom>
+            <a:noFill/>
+            <a:ln>
+              <a:noFill/>
+            </a:ln>
+          </p:spPr>
+          <p:txBody>
+            <a:bodyPr wrap="square" rtlCol="0">
+              <a:spAutoFit/>
+            </a:bodyPr>
+            <a:lstStyle/>
+            <a:p>
+              <a:r>
+                <a:rPr lang="ko-KR" altLang="en-US" sz="1500" smtClean="0"/>
+                <a:t>그림 </a:t>
+              </a:r>
+              <a:r>
+                <a:rPr lang="en-US" altLang="ko-KR" sz="1500" dirty="0"/>
+                <a:t>7</a:t>
+              </a:r>
+              <a:r>
+                <a:rPr lang="en-US" altLang="ko-KR" sz="1500" smtClean="0"/>
+                <a:t>. </a:t>
+              </a:r>
+              <a:r>
+                <a:rPr lang="ko-KR" altLang="en-US" sz="1500" smtClean="0"/>
+                <a:t>캐릭터 메시 뿌리 변환</a:t>
+              </a:r>
+              <a:endParaRPr lang="en-US" altLang="ko-KR" sz="1500" dirty="0"/>
+            </a:p>
+          </p:txBody>
+        </p:sp>
+      </p:grpSp>
+    </p:spTree>
+    <p:extLst>
+      <p:ext uri="{BB962C8B-B14F-4D97-AF65-F5344CB8AC3E}">
+        <p14:creationId xmlns:p14="http://schemas.microsoft.com/office/powerpoint/2010/main" val="590890797"/>
+      </p:ext>
+    </p:extLst>
+  </p:cSld>
+  <p:clrMapOvr>
+    <a:masterClrMapping/>
+  </p:clrMapOvr>
+  <mc:AlternateContent xmlns:mc="http://schemas.openxmlformats.org/markup-compatibility/2006" xmlns:p14="http://schemas.microsoft.com/office/powerpoint/2010/main">
+    <mc:Choice Requires="p14">
+      <p:transition spd="med" p14:dur="700">
+        <p:fade/>
+      </p:transition>
+    </mc:Choice>
+    <mc:Fallback xmlns="">
+      <p:transition spd="med">
+        <p:fade/>
+      </p:transition>
+    </mc:Fallback>
+  </mc:AlternateContent>
+</p:sld>
+</file>
+
+<file path=ppt/slides/slide9.xml><?xml version="1.0" encoding="utf-8"?>
+<p:sld xmlns:a="http://schemas.openxmlformats.org/drawingml/2006/main" xmlns:r="http://schemas.openxmlformats.org/officeDocument/2006/relationships" xmlns:p="http://schemas.openxmlformats.org/presentationml/2006/main">
+  <p:cSld>
+    <p:spTree>
+      <p:nvGrpSpPr>
+        <p:cNvPr id="1" name=""/>
+        <p:cNvGrpSpPr/>
+        <p:nvPr/>
+      </p:nvGrpSpPr>
+      <p:grpSpPr>
+        <a:xfrm>
+          <a:off x="0" y="0"/>
+          <a:ext cx="0" cy="0"/>
+          <a:chOff x="0" y="0"/>
+          <a:chExt cx="0" cy="0"/>
+        </a:xfrm>
+      </p:grpSpPr>
       <p:sp>
         <p:nvSpPr>
-          <p:cNvPr id="3" name="내용 개체 틀 2"/>
+          <p:cNvPr id="2" name="제목 1"/>
           <p:cNvSpPr>
             <a:spLocks noGrp="1"/>
           </p:cNvSpPr>
           <p:nvPr>
-            <p:ph idx="1"/>
+            <p:ph type="title"/>
           </p:nvPr>
         </p:nvSpPr>
         <p:spPr>
           <a:xfrm>
-            <a:off x="1295399" y="1420092"/>
-            <a:ext cx="9874827" cy="4461163"/>
+            <a:off x="1295400" y="503854"/>
+            <a:ext cx="9601200" cy="625035"/>
           </a:xfrm>
         </p:spPr>
         <p:txBody>
-          <a:bodyPr rtlCol="0"/>
+          <a:bodyPr rtlCol="0">
+            <a:normAutofit fontScale="90000"/>
+          </a:bodyPr>
           <a:lstStyle/>
           <a:p>
-            <a:pPr rtl="0"/>
-            <a:endParaRPr lang="en-US" altLang="ko-KR" smtClean="0"/>
-          </a:p>
-          <a:p>
-            <a:pPr rtl="0"/>
-            <a:r>
-              <a:rPr lang="ko-KR" altLang="en-US" smtClean="0"/>
-              <a:t>카메라 클래스는 지정된 카메라 위치</a:t>
-            </a:r>
-            <a:r>
-              <a:rPr lang="en-US" altLang="ko-KR" smtClean="0"/>
-              <a:t>, </a:t>
-            </a:r>
-            <a:r>
-              <a:rPr lang="ko-KR" altLang="en-US" smtClean="0"/>
-              <a:t>방향으로 카메라 좌표계를 정의</a:t>
-            </a:r>
-            <a:endParaRPr lang="en-US" altLang="ko-KR" smtClean="0"/>
-          </a:p>
-          <a:p>
-            <a:pPr rtl="0"/>
-            <a:r>
-              <a:rPr lang="ko-KR" altLang="en-US" smtClean="0"/>
-              <a:t>방향은 세계 좌표계 기준 세 정규직교벡터</a:t>
-            </a:r>
-            <a:r>
-              <a:rPr lang="en-US" altLang="ko-KR" smtClean="0"/>
-              <a:t>, </a:t>
-            </a:r>
-            <a:r>
-              <a:rPr lang="ko-KR" altLang="en-US" smtClean="0"/>
-              <a:t>즉 오른쪽 벡터</a:t>
-            </a:r>
-            <a:r>
-              <a:rPr lang="en-US" altLang="ko-KR" smtClean="0"/>
-              <a:t>, </a:t>
-            </a:r>
-            <a:r>
-              <a:rPr lang="ko-KR" altLang="en-US" smtClean="0"/>
-              <a:t>상향 벡터</a:t>
-            </a:r>
-            <a:r>
-              <a:rPr lang="en-US" altLang="ko-KR" smtClean="0"/>
-              <a:t>, </a:t>
-            </a:r>
-            <a:r>
-              <a:rPr lang="ko-KR" altLang="en-US" smtClean="0"/>
-              <a:t>시선 벡터로 지정</a:t>
-            </a:r>
-            <a:endParaRPr lang="en-US" altLang="ko-KR"/>
-          </a:p>
-          <a:p>
-            <a:pPr rtl="0"/>
-            <a:r>
-              <a:rPr lang="ko-KR" altLang="en-US" smtClean="0"/>
-              <a:t>동적 색인화는 셰이더 모현 </a:t>
-            </a:r>
-            <a:r>
-              <a:rPr lang="en-US" altLang="ko-KR" smtClean="0"/>
-              <a:t>5.1</a:t>
-            </a:r>
-            <a:r>
-              <a:rPr lang="ko-KR" altLang="en-US" smtClean="0"/>
-              <a:t>에 새로 도입된 기능</a:t>
-            </a:r>
-            <a:r>
-              <a:rPr lang="en-US" altLang="ko-KR" smtClean="0"/>
-              <a:t>, </a:t>
-            </a:r>
-            <a:r>
-              <a:rPr lang="ko-KR" altLang="en-US" smtClean="0"/>
-              <a:t>이를 이용하면 텍스처 자원들을 담은 배열을 동적으로 색인화할 수 있다</a:t>
-            </a:r>
-            <a:r>
-              <a:rPr lang="en-US" altLang="ko-KR" smtClean="0"/>
-              <a:t>.</a:t>
-            </a:r>
-            <a:endParaRPr lang="en-US" altLang="ko-KR"/>
-          </a:p>
-          <a:p>
-            <a:pPr rtl="0"/>
-            <a:r>
-              <a:rPr lang="ko-KR" altLang="en-US" smtClean="0"/>
-              <a:t>크기와 형식이 서로 다른 텍스처들을 담은 배열의 동적 색인화가 가능</a:t>
-            </a:r>
-            <a:endParaRPr lang="en-US" altLang="ko-KR" smtClean="0"/>
+            <a:pPr>
+              <a:lnSpc>
+                <a:spcPct val="100000"/>
+              </a:lnSpc>
+            </a:pPr>
+            <a:r>
+              <a:rPr lang="en-US" altLang="ko-KR" sz="3600" smtClean="0"/>
+              <a:t>23.2.2 </a:t>
+            </a:r>
+            <a:r>
+              <a:rPr lang="ko-KR" altLang="en-US" sz="3600" smtClean="0"/>
+              <a:t>정점 혼합</a:t>
+            </a:r>
+            <a:endParaRPr lang="ko-KR" altLang="en-US" sz="2400" dirty="0"/>
           </a:p>
         </p:txBody>
       </p:sp>
+      <p:grpSp>
+        <p:nvGrpSpPr>
+          <p:cNvPr id="6" name="그룹 5"/>
+          <p:cNvGrpSpPr/>
+          <p:nvPr/>
+        </p:nvGrpSpPr>
+        <p:grpSpPr>
+          <a:xfrm>
+            <a:off x="2364643" y="1402865"/>
+            <a:ext cx="7396142" cy="4578634"/>
+            <a:chOff x="2364643" y="1402865"/>
+            <a:chExt cx="7396142" cy="4578634"/>
+          </a:xfrm>
+        </p:grpSpPr>
+        <p:pic>
+          <p:nvPicPr>
+            <p:cNvPr id="5" name="그림 4"/>
+            <p:cNvPicPr>
+              <a:picLocks noChangeAspect="1"/>
+            </p:cNvPicPr>
+            <p:nvPr/>
+          </p:nvPicPr>
+          <p:blipFill>
+            <a:blip r:embed="rId3">
+              <a:extLst>
+                <a:ext uri="{28A0092B-C50C-407E-A947-70E740481C1C}">
+                  <a14:useLocalDpi xmlns:a14="http://schemas.microsoft.com/office/drawing/2010/main" val="0"/>
+                </a:ext>
+              </a:extLst>
+            </a:blip>
+            <a:stretch>
+              <a:fillRect/>
+            </a:stretch>
+          </p:blipFill>
+          <p:spPr>
+            <a:xfrm>
+              <a:off x="2431215" y="1402865"/>
+              <a:ext cx="7329570" cy="4255469"/>
+            </a:xfrm>
+            <a:prstGeom prst="rect">
+              <a:avLst/>
+            </a:prstGeom>
+          </p:spPr>
+        </p:pic>
+        <p:sp>
+          <p:nvSpPr>
+            <p:cNvPr id="7" name="TextBox 6">
+              <a:extLst>
+                <a:ext uri="{FF2B5EF4-FFF2-40B4-BE49-F238E27FC236}">
+                  <a16:creationId xmlns="" xmlns:a16="http://schemas.microsoft.com/office/drawing/2014/main" id="{69F81465-6DFE-4098-8458-39E005A83CA5}"/>
+                </a:ext>
+              </a:extLst>
+            </p:cNvPr>
+            <p:cNvSpPr txBox="1"/>
+            <p:nvPr/>
+          </p:nvSpPr>
+          <p:spPr>
+            <a:xfrm>
+              <a:off x="2364643" y="5658334"/>
+              <a:ext cx="3731357" cy="323165"/>
+            </a:xfrm>
+            <a:prstGeom prst="rect">
+              <a:avLst/>
+            </a:prstGeom>
+            <a:noFill/>
+            <a:ln>
+              <a:noFill/>
+            </a:ln>
+          </p:spPr>
+          <p:txBody>
+            <a:bodyPr wrap="square" rtlCol="0">
+              <a:spAutoFit/>
+            </a:bodyPr>
+            <a:lstStyle/>
+            <a:p>
+              <a:r>
+                <a:rPr lang="ko-KR" altLang="en-US" sz="1500" smtClean="0"/>
+                <a:t>그림 </a:t>
+              </a:r>
+              <a:r>
+                <a:rPr lang="en-US" altLang="ko-KR" sz="1500" dirty="0"/>
+                <a:t>8</a:t>
+              </a:r>
+              <a:r>
+                <a:rPr lang="en-US" altLang="ko-KR" sz="1500" smtClean="0"/>
+                <a:t>. </a:t>
+              </a:r>
+              <a:r>
+                <a:rPr lang="ko-KR" altLang="en-US" sz="1500" smtClean="0"/>
+                <a:t>행렬 팔레트</a:t>
+              </a:r>
+              <a:endParaRPr lang="en-US" altLang="ko-KR" sz="1500" dirty="0"/>
+            </a:p>
+          </p:txBody>
+        </p:sp>
+      </p:grpSp>
     </p:spTree>
     <p:extLst>
       <p:ext uri="{BB962C8B-B14F-4D97-AF65-F5344CB8AC3E}">
-        <p14:creationId xmlns:p14="http://schemas.microsoft.com/office/powerpoint/2010/main" val="666717879"/>
+        <p14:creationId xmlns:p14="http://schemas.microsoft.com/office/powerpoint/2010/main" val="3324986726"/>
       </p:ext>
     </p:extLst>
   </p:cSld>

</xml_diff>